<commit_message>
more pictures added to slides and need to format the text
</commit_message>
<xml_diff>
--- a/kick_off_presentation/wsnlab-ss19-kickoff-group1.pptx
+++ b/kick_off_presentation/wsnlab-ss19-kickoff-group1.pptx
@@ -248,7 +248,7 @@
           </a:bodyPr>
           <a:p>
             <a:pPr algn="r"/>
-            <a:fld id="{86F82B6F-2B10-42C4-A558-0CED42B7E0DE}" type="slidenum">
+            <a:fld id="{D20E3AE8-FBC4-43C1-9CBE-F93768EE9CB3}" type="slidenum">
               <a:rPr b="0" lang="en-US" sz="1400" spc="-1" strike="noStrike">
                 <a:latin typeface="Nimbus Roman"/>
               </a:rPr>
@@ -285,7 +285,7 @@
       </p:grpSpPr>
       <p:sp>
         <p:nvSpPr>
-          <p:cNvPr id="158" name="PlaceHolder 1"/>
+          <p:cNvPr id="165" name="PlaceHolder 1"/>
           <p:cNvSpPr>
             <a:spLocks noGrp="1"/>
           </p:cNvSpPr>
@@ -296,16 +296,16 @@
         <p:spPr>
           <a:xfrm>
             <a:off x="1143000" y="685800"/>
-            <a:ext cx="4571280" cy="3428280"/>
-          </a:xfrm>
-          <a:prstGeom prst="rect">
-            <a:avLst/>
-          </a:prstGeom>
-        </p:spPr>
-      </p:sp>
-      <p:sp>
-        <p:nvSpPr>
-          <p:cNvPr id="159" name="PlaceHolder 2"/>
+            <a:ext cx="4570920" cy="3427920"/>
+          </a:xfrm>
+          <a:prstGeom prst="rect">
+            <a:avLst/>
+          </a:prstGeom>
+        </p:spPr>
+      </p:sp>
+      <p:sp>
+        <p:nvSpPr>
+          <p:cNvPr id="166" name="PlaceHolder 2"/>
           <p:cNvSpPr>
             <a:spLocks noGrp="1"/>
           </p:cNvSpPr>
@@ -316,7 +316,7 @@
         <p:spPr>
           <a:xfrm>
             <a:off x="685800" y="4343400"/>
-            <a:ext cx="5485680" cy="4114080"/>
+            <a:ext cx="5485320" cy="4113720"/>
           </a:xfrm>
           <a:prstGeom prst="rect">
             <a:avLst/>
@@ -327,7 +327,7 @@
             <a:noAutofit/>
           </a:bodyPr>
           <a:p>
-            <a:pPr marL="216000" indent="-216000">
+            <a:pPr marL="216000" indent="-215640">
               <a:lnSpc>
                 <a:spcPct val="100000"/>
               </a:lnSpc>
@@ -339,24 +339,53 @@
                 </a:solidFill>
                 <a:latin typeface="Arial"/>
               </a:rPr>
-              <a:t>As the world energy demands increase and as we transition the source of energy production to renewable and sustainable sources, we need more efficient ways of producing energy. Solar energy being one of the most widespread renewables around would definitely benefit from increased efficiency of energy production</a:t>
+              <a:t>As the world energy demands increase and as we transition the source of energy production to renewable and sustainable sources, we need more efficient ways of producing energy. </a:t>
             </a:r>
             <a:endParaRPr b="0" lang="en-US" sz="1800" spc="-1" strike="noStrike">
               <a:latin typeface="Nimbus Sans"/>
             </a:endParaRPr>
           </a:p>
-        </p:txBody>
-      </p:sp>
-      <p:sp>
-        <p:nvSpPr>
-          <p:cNvPr id="160" name="CustomShape 3"/>
+          <a:p>
+            <a:pPr marL="216000" indent="-215640">
+              <a:lnSpc>
+                <a:spcPct val="100000"/>
+              </a:lnSpc>
+            </a:pPr>
+            <a:endParaRPr b="0" lang="en-US" sz="1800" spc="-1" strike="noStrike">
+              <a:latin typeface="Nimbus Sans"/>
+            </a:endParaRPr>
+          </a:p>
+          <a:p>
+            <a:pPr marL="216000" indent="-215640">
+              <a:lnSpc>
+                <a:spcPct val="100000"/>
+              </a:lnSpc>
+            </a:pPr>
+            <a:r>
+              <a:rPr b="0" lang="en-US" sz="1800" spc="-1" strike="noStrike">
+                <a:solidFill>
+                  <a:srgbClr val="000000"/>
+                </a:solidFill>
+                <a:latin typeface="Arial"/>
+              </a:rPr>
+              <a:t>Solar energy being one of the most widespread renewables around would definitely benefit from increased efficiency of energy production</a:t>
+            </a:r>
+            <a:endParaRPr b="0" lang="en-US" sz="1800" spc="-1" strike="noStrike">
+              <a:latin typeface="Nimbus Sans"/>
+            </a:endParaRPr>
+          </a:p>
+        </p:txBody>
+      </p:sp>
+      <p:sp>
+        <p:nvSpPr>
+          <p:cNvPr id="167" name="CustomShape 3"/>
           <p:cNvSpPr/>
           <p:nvPr/>
         </p:nvSpPr>
         <p:spPr>
           <a:xfrm>
             <a:off x="3884760" y="8685360"/>
-            <a:ext cx="2971080" cy="456480"/>
+            <a:ext cx="2970720" cy="456120"/>
           </a:xfrm>
           <a:prstGeom prst="rect">
             <a:avLst/>
@@ -382,7 +411,7 @@
                 <a:spcPct val="100000"/>
               </a:lnSpc>
             </a:pPr>
-            <a:fld id="{FAB50873-57C0-4869-B4A3-540B9BFC78F5}" type="slidenum">
+            <a:fld id="{E04D0588-C8B8-44C7-B25F-2B386267FFF5}" type="slidenum">
               <a:rPr b="0" lang="en-US" sz="1200" spc="-1" strike="noStrike">
                 <a:solidFill>
                   <a:srgbClr val="000000"/>
@@ -393,6 +422,258 @@
               <a:t>&lt;number&gt;</a:t>
             </a:fld>
             <a:endParaRPr b="0" lang="en-US" sz="1200" spc="-1" strike="noStrike">
+              <a:latin typeface="Nimbus Sans"/>
+            </a:endParaRPr>
+          </a:p>
+        </p:txBody>
+      </p:sp>
+    </p:spTree>
+  </p:cSld>
+</p:notes>
+</file>
+
+<file path=ppt/notesSlides/notesSlide3.xml><?xml version="1.0" encoding="utf-8"?>
+<p:notes xmlns:a="http://schemas.openxmlformats.org/drawingml/2006/main" xmlns:p="http://schemas.openxmlformats.org/presentationml/2006/main" xmlns:r="http://schemas.openxmlformats.org/officeDocument/2006/relationships" xmlns:p14="http://schemas.microsoft.com/office/powerpoint/2010/main" xmlns:p15="http://schemas.microsoft.com/office/powerpoint/2012/main" xmlns:mc="http://schemas.openxmlformats.org/markup-compatibility/2006">
+  <p:cSld>
+    <p:spTree>
+      <p:nvGrpSpPr>
+        <p:cNvPr id="1" name=""/>
+        <p:cNvGrpSpPr/>
+        <p:nvPr/>
+      </p:nvGrpSpPr>
+      <p:grpSpPr>
+        <a:xfrm>
+          <a:off x="0" y="0"/>
+          <a:ext cx="0" cy="0"/>
+          <a:chOff x="0" y="0"/>
+          <a:chExt cx="0" cy="0"/>
+        </a:xfrm>
+      </p:grpSpPr>
+      <p:sp>
+        <p:nvSpPr>
+          <p:cNvPr id="168" name="PlaceHolder 1"/>
+          <p:cNvSpPr>
+            <a:spLocks noGrp="1"/>
+          </p:cNvSpPr>
+          <p:nvPr>
+            <p:ph type="sldImg"/>
+          </p:nvPr>
+        </p:nvSpPr>
+        <p:spPr>
+          <a:xfrm>
+            <a:off x="1371600" y="764280"/>
+            <a:ext cx="5028480" cy="3771360"/>
+          </a:xfrm>
+          <a:prstGeom prst="rect">
+            <a:avLst/>
+          </a:prstGeom>
+        </p:spPr>
+      </p:sp>
+      <p:sp>
+        <p:nvSpPr>
+          <p:cNvPr id="169" name="PlaceHolder 2"/>
+          <p:cNvSpPr>
+            <a:spLocks noGrp="1"/>
+          </p:cNvSpPr>
+          <p:nvPr>
+            <p:ph type="body"/>
+          </p:nvPr>
+        </p:nvSpPr>
+        <p:spPr>
+          <a:xfrm>
+            <a:off x="777240" y="4777560"/>
+            <a:ext cx="6217560" cy="4525920"/>
+          </a:xfrm>
+          <a:prstGeom prst="rect">
+            <a:avLst/>
+          </a:prstGeom>
+        </p:spPr>
+        <p:txBody>
+          <a:bodyPr lIns="0" rIns="0" tIns="0" bIns="0">
+            <a:spAutoFit/>
+          </a:bodyPr>
+          <a:p>
+            <a:pPr>
+              <a:lnSpc>
+                <a:spcPct val="125000"/>
+              </a:lnSpc>
+            </a:pPr>
+            <a:r>
+              <a:rPr b="0" lang="en-US" sz="2000" spc="-1" strike="noStrike">
+                <a:solidFill>
+                  <a:srgbClr val="000000"/>
+                </a:solidFill>
+                <a:latin typeface="Arial"/>
+                <a:ea typeface="DejaVu Sans"/>
+              </a:rPr>
+              <a:t>A major problem with solar panels is to track the motion of the sun in 2-axis</a:t>
+            </a:r>
+            <a:endParaRPr b="0" lang="en-US" sz="2000" spc="-1" strike="noStrike">
+              <a:latin typeface="Nimbus Sans"/>
+            </a:endParaRPr>
+          </a:p>
+          <a:p>
+            <a:pPr>
+              <a:lnSpc>
+                <a:spcPct val="125000"/>
+              </a:lnSpc>
+            </a:pPr>
+            <a:r>
+              <a:rPr b="0" lang="en-US" sz="2000" spc="-1" strike="noStrike">
+                <a:solidFill>
+                  <a:srgbClr val="000000"/>
+                </a:solidFill>
+                <a:latin typeface="Arial"/>
+                <a:ea typeface="DejaVu Sans"/>
+              </a:rPr>
+              <a:t>One during the day from East to West</a:t>
+            </a:r>
+            <a:endParaRPr b="0" lang="en-US" sz="2000" spc="-1" strike="noStrike">
+              <a:latin typeface="Nimbus Sans"/>
+            </a:endParaRPr>
+          </a:p>
+          <a:p>
+            <a:r>
+              <a:rPr b="0" lang="en-US" sz="2000" spc="-1" strike="noStrike">
+                <a:solidFill>
+                  <a:srgbClr val="000000"/>
+                </a:solidFill>
+                <a:latin typeface="Arial"/>
+                <a:ea typeface="DejaVu Sans"/>
+              </a:rPr>
+              <a:t>One during the months from North to South</a:t>
+            </a:r>
+            <a:endParaRPr b="0" lang="en-US" sz="2000" spc="-1" strike="noStrike">
+              <a:latin typeface="Nimbus Sans"/>
+            </a:endParaRPr>
+          </a:p>
+          <a:p>
+            <a:endParaRPr b="0" lang="en-US" sz="2000" spc="-1" strike="noStrike">
+              <a:latin typeface="Nimbus Sans"/>
+            </a:endParaRPr>
+          </a:p>
+          <a:p>
+            <a:pPr>
+              <a:lnSpc>
+                <a:spcPct val="125000"/>
+              </a:lnSpc>
+            </a:pPr>
+            <a:r>
+              <a:rPr b="0" lang="en-US" sz="2000" spc="-1" strike="noStrike">
+                <a:solidFill>
+                  <a:srgbClr val="000000"/>
+                </a:solidFill>
+                <a:latin typeface="Arial"/>
+                <a:ea typeface="DejaVu Sans"/>
+              </a:rPr>
+              <a:t>Advantages</a:t>
+            </a:r>
+            <a:endParaRPr b="0" lang="en-US" sz="2000" spc="-1" strike="noStrike">
+              <a:latin typeface="Nimbus Sans"/>
+            </a:endParaRPr>
+          </a:p>
+          <a:p>
+            <a:pPr>
+              <a:lnSpc>
+                <a:spcPct val="125000"/>
+              </a:lnSpc>
+            </a:pPr>
+            <a:r>
+              <a:rPr b="0" lang="en-US" sz="2000" spc="-1" strike="noStrike">
+                <a:solidFill>
+                  <a:srgbClr val="000000"/>
+                </a:solidFill>
+                <a:latin typeface="Arial"/>
+                <a:ea typeface="DejaVu Sans"/>
+              </a:rPr>
+              <a:t>More energy production, typically 10-25% increase</a:t>
+            </a:r>
+            <a:endParaRPr b="0" lang="en-US" sz="2000" spc="-1" strike="noStrike">
+              <a:latin typeface="Nimbus Sans"/>
+            </a:endParaRPr>
+          </a:p>
+          <a:p>
+            <a:pPr>
+              <a:lnSpc>
+                <a:spcPct val="125000"/>
+              </a:lnSpc>
+            </a:pPr>
+            <a:endParaRPr b="0" lang="en-US" sz="2000" spc="-1" strike="noStrike">
+              <a:latin typeface="Nimbus Sans"/>
+            </a:endParaRPr>
+          </a:p>
+          <a:p>
+            <a:pPr>
+              <a:lnSpc>
+                <a:spcPct val="125000"/>
+              </a:lnSpc>
+            </a:pPr>
+            <a:r>
+              <a:rPr b="0" lang="en-US" sz="2000" spc="-1" strike="noStrike">
+                <a:solidFill>
+                  <a:srgbClr val="000000"/>
+                </a:solidFill>
+                <a:latin typeface="Arial"/>
+                <a:ea typeface="DejaVu Sans"/>
+              </a:rPr>
+              <a:t>Disadvantages</a:t>
+            </a:r>
+            <a:endParaRPr b="0" lang="en-US" sz="2000" spc="-1" strike="noStrike">
+              <a:latin typeface="Nimbus Sans"/>
+            </a:endParaRPr>
+          </a:p>
+          <a:p>
+            <a:pPr>
+              <a:lnSpc>
+                <a:spcPct val="125000"/>
+              </a:lnSpc>
+            </a:pPr>
+            <a:r>
+              <a:rPr b="0" lang="en-US" sz="2000" spc="-1" strike="noStrike">
+                <a:solidFill>
+                  <a:srgbClr val="000000"/>
+                </a:solidFill>
+                <a:latin typeface="Arial"/>
+                <a:ea typeface="DejaVu Sans"/>
+              </a:rPr>
+              <a:t>More complex, need addional Hardware</a:t>
+            </a:r>
+            <a:endParaRPr b="0" lang="en-US" sz="2000" spc="-1" strike="noStrike">
+              <a:latin typeface="Nimbus Sans"/>
+            </a:endParaRPr>
+          </a:p>
+          <a:p>
+            <a:pPr>
+              <a:lnSpc>
+                <a:spcPct val="125000"/>
+              </a:lnSpc>
+            </a:pPr>
+            <a:r>
+              <a:rPr b="0" lang="en-US" sz="2000" spc="-1" strike="noStrike">
+                <a:solidFill>
+                  <a:srgbClr val="000000"/>
+                </a:solidFill>
+                <a:latin typeface="Arial"/>
+                <a:ea typeface="DejaVu Sans"/>
+              </a:rPr>
+              <a:t>Needs time to set up and maintenance work in the field</a:t>
+            </a:r>
+            <a:endParaRPr b="0" lang="en-US" sz="2000" spc="-1" strike="noStrike">
+              <a:latin typeface="Nimbus Sans"/>
+            </a:endParaRPr>
+          </a:p>
+          <a:p>
+            <a:r>
+              <a:rPr b="0" lang="en-US" sz="2000" spc="-1" strike="noStrike">
+                <a:solidFill>
+                  <a:srgbClr val="000000"/>
+                </a:solidFill>
+                <a:latin typeface="Arial"/>
+                <a:ea typeface="DejaVu Sans"/>
+              </a:rPr>
+              <a:t>Shadowing</a:t>
+            </a:r>
+            <a:endParaRPr b="0" lang="en-US" sz="2000" spc="-1" strike="noStrike">
               <a:latin typeface="Nimbus Sans"/>
             </a:endParaRPr>
           </a:p>
@@ -422,7 +703,7 @@
       </p:grpSpPr>
       <p:sp>
         <p:nvSpPr>
-          <p:cNvPr id="161" name="PlaceHolder 1"/>
+          <p:cNvPr id="170" name="PlaceHolder 1"/>
           <p:cNvSpPr>
             <a:spLocks noGrp="1"/>
           </p:cNvSpPr>
@@ -433,16 +714,16 @@
         <p:spPr>
           <a:xfrm>
             <a:off x="1143000" y="685800"/>
-            <a:ext cx="4571280" cy="3428280"/>
-          </a:xfrm>
-          <a:prstGeom prst="rect">
-            <a:avLst/>
-          </a:prstGeom>
-        </p:spPr>
-      </p:sp>
-      <p:sp>
-        <p:nvSpPr>
-          <p:cNvPr id="162" name="PlaceHolder 2"/>
+            <a:ext cx="4570920" cy="3427920"/>
+          </a:xfrm>
+          <a:prstGeom prst="rect">
+            <a:avLst/>
+          </a:prstGeom>
+        </p:spPr>
+      </p:sp>
+      <p:sp>
+        <p:nvSpPr>
+          <p:cNvPr id="171" name="PlaceHolder 2"/>
           <p:cNvSpPr>
             <a:spLocks noGrp="1"/>
           </p:cNvSpPr>
@@ -453,7 +734,7 @@
         <p:spPr>
           <a:xfrm>
             <a:off x="685800" y="4343400"/>
-            <a:ext cx="5485680" cy="4114080"/>
+            <a:ext cx="5485320" cy="4113720"/>
           </a:xfrm>
           <a:prstGeom prst="rect">
             <a:avLst/>
@@ -472,14 +753,14 @@
       </p:sp>
       <p:sp>
         <p:nvSpPr>
-          <p:cNvPr id="163" name="CustomShape 3"/>
+          <p:cNvPr id="172" name="CustomShape 3"/>
           <p:cNvSpPr/>
           <p:nvPr/>
         </p:nvSpPr>
         <p:spPr>
           <a:xfrm>
             <a:off x="3884760" y="8685360"/>
-            <a:ext cx="2971080" cy="456480"/>
+            <a:ext cx="2970720" cy="456120"/>
           </a:xfrm>
           <a:prstGeom prst="rect">
             <a:avLst/>
@@ -505,7 +786,7 @@
                 <a:spcPct val="100000"/>
               </a:lnSpc>
             </a:pPr>
-            <a:fld id="{63DB2AB2-4802-4649-BE87-84421F14AF7D}" type="slidenum">
+            <a:fld id="{CBA9E59B-48C0-40A6-98C8-6D596D7F9067}" type="slidenum">
               <a:rPr b="0" lang="en-US" sz="1200" spc="-1" strike="noStrike">
                 <a:solidFill>
                   <a:srgbClr val="000000"/>
@@ -545,7 +826,7 @@
       </p:grpSpPr>
       <p:sp>
         <p:nvSpPr>
-          <p:cNvPr id="164" name="PlaceHolder 1"/>
+          <p:cNvPr id="173" name="PlaceHolder 1"/>
           <p:cNvSpPr>
             <a:spLocks noGrp="1"/>
           </p:cNvSpPr>
@@ -556,16 +837,16 @@
         <p:spPr>
           <a:xfrm>
             <a:off x="1143000" y="685800"/>
-            <a:ext cx="4571280" cy="3428280"/>
-          </a:xfrm>
-          <a:prstGeom prst="rect">
-            <a:avLst/>
-          </a:prstGeom>
-        </p:spPr>
-      </p:sp>
-      <p:sp>
-        <p:nvSpPr>
-          <p:cNvPr id="165" name="PlaceHolder 2"/>
+            <a:ext cx="4570920" cy="3427920"/>
+          </a:xfrm>
+          <a:prstGeom prst="rect">
+            <a:avLst/>
+          </a:prstGeom>
+        </p:spPr>
+      </p:sp>
+      <p:sp>
+        <p:nvSpPr>
+          <p:cNvPr id="174" name="PlaceHolder 2"/>
           <p:cNvSpPr>
             <a:spLocks noGrp="1"/>
           </p:cNvSpPr>
@@ -576,7 +857,7 @@
         <p:spPr>
           <a:xfrm>
             <a:off x="685800" y="4343400"/>
-            <a:ext cx="5485680" cy="4114080"/>
+            <a:ext cx="5485320" cy="4113720"/>
           </a:xfrm>
           <a:prstGeom prst="rect">
             <a:avLst/>
@@ -595,14 +876,14 @@
       </p:sp>
       <p:sp>
         <p:nvSpPr>
-          <p:cNvPr id="166" name="CustomShape 3"/>
+          <p:cNvPr id="175" name="CustomShape 3"/>
           <p:cNvSpPr/>
           <p:nvPr/>
         </p:nvSpPr>
         <p:spPr>
           <a:xfrm>
             <a:off x="3884760" y="8685360"/>
-            <a:ext cx="2971080" cy="456480"/>
+            <a:ext cx="2970720" cy="456120"/>
           </a:xfrm>
           <a:prstGeom prst="rect">
             <a:avLst/>
@@ -628,7 +909,7 @@
                 <a:spcPct val="100000"/>
               </a:lnSpc>
             </a:pPr>
-            <a:fld id="{1EABE87F-10AC-48F5-9EC6-EFB599E83EC6}" type="slidenum">
+            <a:fld id="{BD9DFC26-9032-467D-A85E-3DBB5F9BD018}" type="slidenum">
               <a:rPr b="0" lang="en-US" sz="1200" spc="-1" strike="noStrike">
                 <a:solidFill>
                   <a:srgbClr val="000000"/>
@@ -4754,7 +5035,7 @@
         <p:spPr>
           <a:xfrm>
             <a:off x="8218440" y="324720"/>
-            <a:ext cx="607680" cy="319680"/>
+            <a:ext cx="607320" cy="319320"/>
           </a:xfrm>
           <a:prstGeom prst="rect">
             <a:avLst/>
@@ -4777,7 +5058,7 @@
         <p:spPr>
           <a:xfrm>
             <a:off x="3970800" y="2235600"/>
-            <a:ext cx="4808880" cy="4199400"/>
+            <a:ext cx="4808520" cy="4199040"/>
           </a:xfrm>
           <a:prstGeom prst="rect">
             <a:avLst/>
@@ -4796,7 +5077,7 @@
         <p:spPr>
           <a:xfrm>
             <a:off x="320400" y="314280"/>
-            <a:ext cx="5071320" cy="514080"/>
+            <a:ext cx="5070960" cy="513720"/>
           </a:xfrm>
           <a:prstGeom prst="rect">
             <a:avLst/>
@@ -4891,7 +5172,7 @@
         <p:spPr>
           <a:xfrm>
             <a:off x="8218440" y="324720"/>
-            <a:ext cx="607680" cy="319680"/>
+            <a:ext cx="607320" cy="319320"/>
           </a:xfrm>
           <a:prstGeom prst="rect">
             <a:avLst/>
@@ -4910,7 +5191,7 @@
         <p:spPr>
           <a:xfrm>
             <a:off x="358920" y="6441840"/>
-            <a:ext cx="7879680" cy="364320"/>
+            <a:ext cx="7879320" cy="363960"/>
           </a:xfrm>
           <a:prstGeom prst="rect">
             <a:avLst/>
@@ -5225,7 +5506,7 @@
         <p:spPr>
           <a:xfrm>
             <a:off x="8218440" y="324720"/>
-            <a:ext cx="607680" cy="319680"/>
+            <a:ext cx="607320" cy="319320"/>
           </a:xfrm>
           <a:prstGeom prst="rect">
             <a:avLst/>
@@ -5244,7 +5525,7 @@
         <p:spPr>
           <a:xfrm>
             <a:off x="358920" y="6441840"/>
-            <a:ext cx="7879680" cy="358200"/>
+            <a:ext cx="7879320" cy="357840"/>
           </a:xfrm>
           <a:prstGeom prst="rect">
             <a:avLst/>
@@ -5559,7 +5840,7 @@
         <p:spPr>
           <a:xfrm>
             <a:off x="8218440" y="324720"/>
-            <a:ext cx="607680" cy="319680"/>
+            <a:ext cx="607320" cy="319320"/>
           </a:xfrm>
           <a:prstGeom prst="rect">
             <a:avLst/>
@@ -5578,7 +5859,7 @@
         <p:spPr>
           <a:xfrm>
             <a:off x="358920" y="6441840"/>
-            <a:ext cx="7879680" cy="358200"/>
+            <a:ext cx="7879320" cy="357840"/>
           </a:xfrm>
           <a:prstGeom prst="rect">
             <a:avLst/>
@@ -5882,7 +6163,7 @@
         <p:spPr>
           <a:xfrm>
             <a:off x="358920" y="2130480"/>
-            <a:ext cx="8421120" cy="1236600"/>
+            <a:ext cx="8420760" cy="1236240"/>
           </a:xfrm>
           <a:prstGeom prst="rect">
             <a:avLst/>
@@ -5914,6 +6195,7 @@
                   <a:srgbClr val="000000"/>
                 </a:solidFill>
                 <a:latin typeface="Arial"/>
+                <a:ea typeface="DejaVu Sans"/>
               </a:rPr>
               <a:t>Solar Tracking Network</a:t>
             </a:r>
@@ -5924,6 +6206,7 @@
                   <a:srgbClr val="000000"/>
                 </a:solidFill>
                 <a:latin typeface="Arial"/>
+                <a:ea typeface="DejaVu Sans"/>
               </a:rPr>
               <a:t>Kick-Off Presentation</a:t>
             </a:r>
@@ -5942,7 +6225,7 @@
         <p:spPr>
           <a:xfrm>
             <a:off x="358920" y="3886200"/>
-            <a:ext cx="4566960" cy="1751760"/>
+            <a:ext cx="4566600" cy="1751400"/>
           </a:xfrm>
           <a:prstGeom prst="rect">
             <a:avLst/>
@@ -5973,7 +6256,11 @@
             </a:pPr>
             <a:r>
               <a:rPr b="1" lang="en-US" sz="1600" spc="-1" strike="noStrike">
+                <a:solidFill>
+                  <a:srgbClr val="000000"/>
+                </a:solidFill>
                 <a:latin typeface="Nimbus Sans"/>
+                <a:ea typeface="DejaVu Sans"/>
               </a:rPr>
               <a:t>Karthik Sukumar &amp; Johannes Machleid</a:t>
             </a:r>
@@ -5992,7 +6279,11 @@
             </a:pPr>
             <a:r>
               <a:rPr b="0" lang="en-US" sz="1600" spc="-1" strike="noStrike">
+                <a:solidFill>
+                  <a:srgbClr val="000000"/>
+                </a:solidFill>
                 <a:latin typeface="Nimbus Sans"/>
+                <a:ea typeface="DejaVu Sans"/>
               </a:rPr>
               <a:t>{Karthik.sukumar,johannes.machleid}@tum.de</a:t>
             </a:r>
@@ -6054,7 +6345,7 @@
         <p:spPr>
           <a:xfrm>
             <a:off x="358920" y="366480"/>
-            <a:ext cx="7166880" cy="359280"/>
+            <a:ext cx="7166520" cy="358920"/>
           </a:xfrm>
           <a:prstGeom prst="rect">
             <a:avLst/>
@@ -6086,6 +6377,7 @@
                   <a:srgbClr val="000000"/>
                 </a:solidFill>
                 <a:latin typeface="Arial"/>
+                <a:ea typeface="DejaVu Sans"/>
               </a:rPr>
               <a:t>Motivation</a:t>
             </a:r>
@@ -6104,7 +6396,7 @@
         <p:spPr>
           <a:xfrm>
             <a:off x="8238960" y="6441840"/>
-            <a:ext cx="563040" cy="358200"/>
+            <a:ext cx="562680" cy="357840"/>
           </a:xfrm>
           <a:prstGeom prst="rect">
             <a:avLst/>
@@ -6130,14 +6422,15 @@
                 <a:spcPct val="100000"/>
               </a:lnSpc>
             </a:pPr>
-            <a:fld id="{809A8E19-E1B3-4109-9905-366B862697FF}" type="slidenum">
+            <a:fld id="{875F3AF6-0E59-457F-824A-1ABE789DAC47}" type="slidenum">
               <a:rPr b="0" lang="en-US" sz="1200" spc="-1" strike="noStrike">
                 <a:solidFill>
                   <a:srgbClr val="000000"/>
                 </a:solidFill>
                 <a:latin typeface="Arial"/>
+                <a:ea typeface="DejaVu Sans"/>
               </a:rPr>
-              <a:t>&lt;number&gt;</a:t>
+              <a:t>1</a:t>
             </a:fld>
             <a:endParaRPr b="0" lang="en-US" sz="1200" spc="-1" strike="noStrike">
               <a:latin typeface="Nimbus Sans"/>
@@ -6158,7 +6451,7 @@
         <p:spPr>
           <a:xfrm>
             <a:off x="2126160" y="1594800"/>
-            <a:ext cx="4892040" cy="3668760"/>
+            <a:ext cx="4891680" cy="3668400"/>
           </a:xfrm>
           <a:prstGeom prst="rect">
             <a:avLst/>
@@ -6170,14 +6463,14 @@
       </p:pic>
       <p:sp>
         <p:nvSpPr>
-          <p:cNvPr id="134" name="TextShape 3"/>
-          <p:cNvSpPr txBox="1"/>
+          <p:cNvPr id="134" name="CustomShape 3"/>
+          <p:cNvSpPr/>
           <p:nvPr/>
         </p:nvSpPr>
         <p:spPr>
           <a:xfrm>
             <a:off x="365760" y="2560320"/>
-            <a:ext cx="1463040" cy="822960"/>
+            <a:ext cx="1462680" cy="639000"/>
           </a:xfrm>
           <a:prstGeom prst="rect">
             <a:avLst/>
@@ -6187,11 +6480,22 @@
             <a:noFill/>
           </a:ln>
         </p:spPr>
+        <p:style>
+          <a:lnRef idx="0"/>
+          <a:fillRef idx="0"/>
+          <a:effectRef idx="0"/>
+          <a:fontRef idx="minor"/>
+        </p:style>
         <p:txBody>
           <a:bodyPr lIns="90000" rIns="90000" tIns="45000" bIns="45000">
             <a:spAutoFit/>
           </a:bodyPr>
           <a:p>
+            <a:pPr>
+              <a:lnSpc>
+                <a:spcPct val="100000"/>
+              </a:lnSpc>
+            </a:pPr>
             <a:r>
               <a:rPr b="0" lang="en-US" sz="1800" spc="-1" strike="noStrike">
                 <a:latin typeface="Nimbus Sans"/>
@@ -6206,14 +6510,14 @@
       </p:sp>
       <p:sp>
         <p:nvSpPr>
-          <p:cNvPr id="135" name="TextShape 4"/>
-          <p:cNvSpPr txBox="1"/>
+          <p:cNvPr id="135" name="CustomShape 4"/>
+          <p:cNvSpPr/>
           <p:nvPr/>
         </p:nvSpPr>
         <p:spPr>
           <a:xfrm>
-            <a:off x="7223760" y="2011680"/>
-            <a:ext cx="1463040" cy="318960"/>
+            <a:off x="7223760" y="2562120"/>
+            <a:ext cx="1462680" cy="363960"/>
           </a:xfrm>
           <a:prstGeom prst="rect">
             <a:avLst/>
@@ -6223,11 +6527,22 @@
             <a:noFill/>
           </a:ln>
         </p:spPr>
+        <p:style>
+          <a:lnRef idx="0"/>
+          <a:fillRef idx="0"/>
+          <a:effectRef idx="0"/>
+          <a:fontRef idx="minor"/>
+        </p:style>
         <p:txBody>
           <a:bodyPr lIns="90000" rIns="90000" tIns="45000" bIns="45000">
             <a:spAutoFit/>
           </a:bodyPr>
           <a:p>
+            <a:pPr>
+              <a:lnSpc>
+                <a:spcPct val="100000"/>
+              </a:lnSpc>
+            </a:pPr>
             <a:r>
               <a:rPr b="0" lang="en-US" sz="1800" spc="-1" strike="noStrike">
                 <a:latin typeface="Nimbus Sans"/>
@@ -6242,14 +6557,14 @@
       </p:sp>
       <p:sp>
         <p:nvSpPr>
-          <p:cNvPr id="136" name="TextShape 5"/>
-          <p:cNvSpPr txBox="1"/>
+          <p:cNvPr id="136" name="CustomShape 5"/>
+          <p:cNvSpPr/>
           <p:nvPr/>
         </p:nvSpPr>
         <p:spPr>
           <a:xfrm>
-            <a:off x="7223760" y="3064320"/>
-            <a:ext cx="1645920" cy="593280"/>
+            <a:off x="7132680" y="3749040"/>
+            <a:ext cx="1645560" cy="364680"/>
           </a:xfrm>
           <a:prstGeom prst="rect">
             <a:avLst/>
@@ -6259,11 +6574,22 @@
             <a:noFill/>
           </a:ln>
         </p:spPr>
+        <p:style>
+          <a:lnRef idx="0"/>
+          <a:fillRef idx="0"/>
+          <a:effectRef idx="0"/>
+          <a:fontRef idx="minor"/>
+        </p:style>
         <p:txBody>
           <a:bodyPr lIns="90000" rIns="90000" tIns="45000" bIns="45000">
             <a:spAutoFit/>
           </a:bodyPr>
           <a:p>
+            <a:pPr>
+              <a:lnSpc>
+                <a:spcPct val="100000"/>
+              </a:lnSpc>
+            </a:pPr>
             <a:r>
               <a:rPr b="0" lang="en-US" sz="1800" spc="-1" strike="noStrike">
                 <a:latin typeface="Nimbus Sans"/>
@@ -6495,8 +6821,8 @@
         </p:blipFill>
         <p:spPr>
           <a:xfrm>
-            <a:off x="4206240" y="3291840"/>
-            <a:ext cx="4552560" cy="3167640"/>
+            <a:off x="4206240" y="1496160"/>
+            <a:ext cx="4552200" cy="3167280"/>
           </a:xfrm>
           <a:prstGeom prst="rect">
             <a:avLst/>
@@ -6518,8 +6844,8 @@
         </p:blipFill>
         <p:spPr>
           <a:xfrm>
-            <a:off x="4998960" y="274320"/>
-            <a:ext cx="3047760" cy="2952360"/>
+            <a:off x="457200" y="1737360"/>
+            <a:ext cx="3047400" cy="2952000"/>
           </a:xfrm>
           <a:prstGeom prst="rect">
             <a:avLst/>
@@ -6538,7 +6864,7 @@
         <p:spPr>
           <a:xfrm>
             <a:off x="358920" y="836640"/>
-            <a:ext cx="4213080" cy="4832640"/>
+            <a:ext cx="4212720" cy="4832280"/>
           </a:xfrm>
           <a:prstGeom prst="rect">
             <a:avLst/>
@@ -6554,85 +6880,6 @@
           <a:effectRef idx="0"/>
           <a:fontRef idx="minor"/>
         </p:style>
-        <p:txBody>
-          <a:bodyPr lIns="90000" rIns="90000" tIns="45000" bIns="45000">
-            <a:noAutofit/>
-          </a:bodyPr>
-          <a:p>
-            <a:pPr marL="179280" indent="-178560">
-              <a:lnSpc>
-                <a:spcPct val="125000"/>
-              </a:lnSpc>
-              <a:buClr>
-                <a:srgbClr val="0065bd"/>
-              </a:buClr>
-              <a:buFont typeface="Wingdings" charset="2"/>
-              <a:buChar char=""/>
-            </a:pPr>
-            <a:r>
-              <a:rPr b="0" lang="en-US" sz="2000" spc="-1" strike="noStrike">
-                <a:solidFill>
-                  <a:srgbClr val="000000"/>
-                </a:solidFill>
-                <a:latin typeface="Arial"/>
-              </a:rPr>
-              <a:t>A major problem with solar panels is to track the motion of the sun in 2-axis</a:t>
-            </a:r>
-            <a:endParaRPr b="0" lang="en-US" sz="2000" spc="-1" strike="noStrike">
-              <a:latin typeface="Nimbus Sans"/>
-            </a:endParaRPr>
-          </a:p>
-          <a:p>
-            <a:pPr lvl="1" marL="432000" indent="-216000">
-              <a:lnSpc>
-                <a:spcPct val="125000"/>
-              </a:lnSpc>
-              <a:buClr>
-                <a:srgbClr val="000000"/>
-              </a:buClr>
-              <a:buSzPct val="45000"/>
-              <a:buFont typeface="Wingdings" charset="2"/>
-              <a:buChar char=""/>
-            </a:pPr>
-            <a:r>
-              <a:rPr b="0" lang="en-US" sz="2000" spc="-1" strike="noStrike">
-                <a:solidFill>
-                  <a:srgbClr val="000000"/>
-                </a:solidFill>
-                <a:latin typeface="Arial"/>
-              </a:rPr>
-              <a:t>One during the day from East to West</a:t>
-            </a:r>
-            <a:endParaRPr b="0" lang="en-US" sz="2000" spc="-1" strike="noStrike">
-              <a:latin typeface="Nimbus Sans"/>
-            </a:endParaRPr>
-          </a:p>
-          <a:p>
-            <a:pPr lvl="1" marL="432000" indent="-216000">
-              <a:lnSpc>
-                <a:spcPct val="125000"/>
-              </a:lnSpc>
-              <a:buClr>
-                <a:srgbClr val="000000"/>
-              </a:buClr>
-              <a:buSzPct val="45000"/>
-              <a:buFont typeface="Wingdings" charset="2"/>
-              <a:buChar char=""/>
-            </a:pPr>
-            <a:r>
-              <a:rPr b="0" lang="en-US" sz="2000" spc="-1" strike="noStrike">
-                <a:solidFill>
-                  <a:srgbClr val="000000"/>
-                </a:solidFill>
-                <a:latin typeface="Arial"/>
-              </a:rPr>
-              <a:t>One during the months from North to South</a:t>
-            </a:r>
-            <a:endParaRPr b="0" lang="en-US" sz="2000" spc="-1" strike="noStrike">
-              <a:latin typeface="Nimbus Sans"/>
-            </a:endParaRPr>
-          </a:p>
-        </p:txBody>
       </p:sp>
       <p:sp>
         <p:nvSpPr>
@@ -6643,7 +6890,7 @@
         <p:spPr>
           <a:xfrm>
             <a:off x="358920" y="366480"/>
-            <a:ext cx="7166880" cy="359280"/>
+            <a:ext cx="5310360" cy="358920"/>
           </a:xfrm>
           <a:prstGeom prst="rect">
             <a:avLst/>
@@ -6675,8 +6922,9 @@
                   <a:srgbClr val="000000"/>
                 </a:solidFill>
                 <a:latin typeface="Arial"/>
+                <a:ea typeface="DejaVu Sans"/>
               </a:rPr>
-              <a:t>Challenges</a:t>
+              <a:t>Challenges of Solar Tracking</a:t>
             </a:r>
             <a:endParaRPr b="0" lang="en-US" sz="2400" spc="-1" strike="noStrike">
               <a:latin typeface="Nimbus Sans"/>
@@ -6684,92 +6932,16 @@
           </a:p>
         </p:txBody>
       </p:sp>
-    </p:spTree>
-  </p:cSld>
-  <mc:AlternateContent>
-    <mc:Choice Requires="p14">
-      <p:transition spd="slow" p14:dur="2000"/>
-    </mc:Choice>
-    <mc:Fallback>
-      <p:transition spd="slow"/>
-    </mc:Fallback>
-  </mc:AlternateContent>
-</p:sld>
-</file>
-
-<file path=ppt/slides/slide4.xml><?xml version="1.0" encoding="utf-8"?>
-<p:sld xmlns:a="http://schemas.openxmlformats.org/drawingml/2006/main" xmlns:p="http://schemas.openxmlformats.org/presentationml/2006/main" xmlns:r="http://schemas.openxmlformats.org/officeDocument/2006/relationships" xmlns:p14="http://schemas.microsoft.com/office/powerpoint/2010/main" xmlns:p15="http://schemas.microsoft.com/office/powerpoint/2012/main" xmlns:mc="http://schemas.openxmlformats.org/markup-compatibility/2006">
-  <p:cSld>
-    <p:spTree>
-      <p:nvGrpSpPr>
-        <p:cNvPr id="1" name=""/>
-        <p:cNvGrpSpPr/>
-        <p:nvPr/>
-      </p:nvGrpSpPr>
-      <p:grpSpPr>
-        <a:xfrm>
-          <a:off x="0" y="0"/>
-          <a:ext cx="0" cy="0"/>
-          <a:chOff x="0" y="0"/>
-          <a:chExt cx="0" cy="0"/>
-        </a:xfrm>
-      </p:grpSpPr>
-      <p:pic>
-        <p:nvPicPr>
-          <p:cNvPr id="141" name="" descr=""/>
-          <p:cNvPicPr/>
-          <p:nvPr/>
-        </p:nvPicPr>
-        <p:blipFill>
-          <a:blip r:embed="rId1"/>
-          <a:stretch/>
-        </p:blipFill>
-        <p:spPr>
-          <a:xfrm>
-            <a:off x="4206240" y="3291840"/>
-            <a:ext cx="4552560" cy="3167640"/>
-          </a:xfrm>
-          <a:prstGeom prst="rect">
-            <a:avLst/>
-          </a:prstGeom>
-          <a:ln>
-            <a:noFill/>
-          </a:ln>
-        </p:spPr>
-      </p:pic>
-      <p:pic>
-        <p:nvPicPr>
-          <p:cNvPr id="142" name="" descr=""/>
-          <p:cNvPicPr/>
-          <p:nvPr/>
-        </p:nvPicPr>
-        <p:blipFill>
-          <a:blip r:embed="rId2"/>
-          <a:stretch/>
-        </p:blipFill>
-        <p:spPr>
-          <a:xfrm>
-            <a:off x="4998960" y="274320"/>
-            <a:ext cx="3047760" cy="2952360"/>
-          </a:xfrm>
-          <a:prstGeom prst="rect">
-            <a:avLst/>
-          </a:prstGeom>
-          <a:ln>
-            <a:noFill/>
-          </a:ln>
-        </p:spPr>
-      </p:pic>
-      <p:sp>
-        <p:nvSpPr>
-          <p:cNvPr id="143" name="CustomShape 1"/>
+      <p:sp>
+        <p:nvSpPr>
+          <p:cNvPr id="141" name="CustomShape 3"/>
           <p:cNvSpPr/>
           <p:nvPr/>
         </p:nvSpPr>
         <p:spPr>
           <a:xfrm>
-            <a:off x="358920" y="548640"/>
-            <a:ext cx="4213080" cy="5718240"/>
+            <a:off x="1280520" y="4846320"/>
+            <a:ext cx="1462680" cy="363960"/>
           </a:xfrm>
           <a:prstGeom prst="rect">
             <a:avLst/>
@@ -6787,153 +6959,218 @@
         </p:style>
         <p:txBody>
           <a:bodyPr lIns="90000" rIns="90000" tIns="45000" bIns="45000">
-            <a:noAutofit/>
-          </a:bodyPr>
-          <a:p>
-            <a:pPr marL="179280" indent="-178560">
+            <a:spAutoFit/>
+          </a:bodyPr>
+          <a:p>
+            <a:pPr>
               <a:lnSpc>
-                <a:spcPct val="125000"/>
+                <a:spcPct val="100000"/>
               </a:lnSpc>
-              <a:buClr>
-                <a:srgbClr val="0065bd"/>
-              </a:buClr>
-              <a:buFont typeface="Wingdings" charset="2"/>
-              <a:buChar char=""/>
             </a:pPr>
             <a:r>
-              <a:rPr b="0" lang="en-US" sz="2000" spc="-1" strike="noStrike">
-                <a:solidFill>
-                  <a:srgbClr val="000000"/>
-                </a:solidFill>
-                <a:latin typeface="Arial"/>
+              <a:rPr b="0" lang="en-US" sz="1800" spc="-1" strike="noStrike" u="sng">
+                <a:uFillTx/>
+                <a:latin typeface="Nimbus Sans"/>
               </a:rPr>
               <a:t>Advantages</a:t>
             </a:r>
-            <a:endParaRPr b="0" lang="en-US" sz="2000" spc="-1" strike="noStrike">
-              <a:latin typeface="Nimbus Sans"/>
-            </a:endParaRPr>
-          </a:p>
-          <a:p>
-            <a:pPr lvl="1" marL="432000" indent="-216000">
+            <a:endParaRPr b="0" lang="en-US" sz="1800" spc="-1" strike="noStrike" u="sng">
+              <a:uFillTx/>
+              <a:latin typeface="Nimbus Sans"/>
+            </a:endParaRPr>
+          </a:p>
+        </p:txBody>
+      </p:sp>
+      <p:sp>
+        <p:nvSpPr>
+          <p:cNvPr id="142" name="CustomShape 4"/>
+          <p:cNvSpPr/>
+          <p:nvPr/>
+        </p:nvSpPr>
+        <p:spPr>
+          <a:xfrm>
+            <a:off x="366120" y="5278320"/>
+            <a:ext cx="3200040" cy="364680"/>
+          </a:xfrm>
+          <a:prstGeom prst="rect">
+            <a:avLst/>
+          </a:prstGeom>
+          <a:noFill/>
+          <a:ln>
+            <a:noFill/>
+          </a:ln>
+        </p:spPr>
+        <p:style>
+          <a:lnRef idx="0"/>
+          <a:fillRef idx="0"/>
+          <a:effectRef idx="0"/>
+          <a:fontRef idx="minor"/>
+        </p:style>
+        <p:txBody>
+          <a:bodyPr lIns="90000" rIns="90000" tIns="45000" bIns="45000">
+            <a:spAutoFit/>
+          </a:bodyPr>
+          <a:p>
+            <a:pPr marL="216000" indent="-216000">
               <a:lnSpc>
-                <a:spcPct val="125000"/>
+                <a:spcPct val="100000"/>
               </a:lnSpc>
               <a:buClr>
                 <a:srgbClr val="000000"/>
               </a:buClr>
-              <a:buSzPct val="45000"/>
               <a:buFont typeface="Wingdings" charset="2"/>
               <a:buChar char=""/>
             </a:pPr>
             <a:r>
-              <a:rPr b="0" lang="en-US" sz="2000" spc="-1" strike="noStrike">
-                <a:solidFill>
-                  <a:srgbClr val="000000"/>
-                </a:solidFill>
-                <a:latin typeface="Arial"/>
+              <a:rPr b="0" lang="en-US" sz="1800" spc="-1" strike="noStrike">
+                <a:latin typeface="Nimbus Sans"/>
               </a:rPr>
-              <a:t>More energy production, typically 10-25% increase</a:t>
+              <a:t>10-25% increased Energy</a:t>
             </a:r>
-            <a:endParaRPr b="0" lang="en-US" sz="2000" spc="-1" strike="noStrike">
-              <a:latin typeface="Nimbus Sans"/>
-            </a:endParaRPr>
-          </a:p>
-          <a:p>
-            <a:pPr marL="179280" indent="-178560">
+            <a:endParaRPr b="0" lang="en-US" sz="1800" spc="-1" strike="noStrike">
+              <a:latin typeface="Nimbus Sans"/>
+            </a:endParaRPr>
+          </a:p>
+        </p:txBody>
+      </p:sp>
+      <p:sp>
+        <p:nvSpPr>
+          <p:cNvPr id="143" name="CustomShape 5"/>
+          <p:cNvSpPr/>
+          <p:nvPr/>
+        </p:nvSpPr>
+        <p:spPr>
+          <a:xfrm>
+            <a:off x="5852520" y="4872600"/>
+            <a:ext cx="1737000" cy="364680"/>
+          </a:xfrm>
+          <a:prstGeom prst="rect">
+            <a:avLst/>
+          </a:prstGeom>
+          <a:noFill/>
+          <a:ln>
+            <a:noFill/>
+          </a:ln>
+        </p:spPr>
+        <p:style>
+          <a:lnRef idx="0"/>
+          <a:fillRef idx="0"/>
+          <a:effectRef idx="0"/>
+          <a:fontRef idx="minor"/>
+        </p:style>
+        <p:txBody>
+          <a:bodyPr lIns="90000" rIns="90000" tIns="45000" bIns="45000">
+            <a:spAutoFit/>
+          </a:bodyPr>
+          <a:p>
+            <a:pPr>
               <a:lnSpc>
-                <a:spcPct val="125000"/>
+                <a:spcPct val="100000"/>
               </a:lnSpc>
-              <a:buClr>
-                <a:srgbClr val="0065bd"/>
-              </a:buClr>
-              <a:buFont typeface="Wingdings" charset="2"/>
-              <a:buChar char=""/>
             </a:pPr>
             <a:r>
-              <a:rPr b="0" lang="en-US" sz="2000" spc="-1" strike="noStrike">
-                <a:solidFill>
-                  <a:srgbClr val="000000"/>
-                </a:solidFill>
-                <a:latin typeface="Arial"/>
+              <a:rPr b="0" lang="en-US" sz="1800" spc="-1" strike="noStrike" u="sng">
+                <a:uFillTx/>
+                <a:latin typeface="Nimbus Sans"/>
               </a:rPr>
-              <a:t>Disadvantages</a:t>
+              <a:t>Disdvantages</a:t>
             </a:r>
-            <a:endParaRPr b="0" lang="en-US" sz="2000" spc="-1" strike="noStrike">
-              <a:latin typeface="Nimbus Sans"/>
-            </a:endParaRPr>
-          </a:p>
-          <a:p>
-            <a:pPr lvl="1" marL="432000" indent="-216000">
+            <a:endParaRPr b="0" lang="en-US" sz="1800" spc="-1" strike="noStrike" u="sng">
+              <a:uFillTx/>
+              <a:latin typeface="Nimbus Sans"/>
+            </a:endParaRPr>
+          </a:p>
+        </p:txBody>
+      </p:sp>
+      <p:sp>
+        <p:nvSpPr>
+          <p:cNvPr id="144" name="CustomShape 6"/>
+          <p:cNvSpPr/>
+          <p:nvPr/>
+        </p:nvSpPr>
+        <p:spPr>
+          <a:xfrm>
+            <a:off x="4938120" y="5304600"/>
+            <a:ext cx="3200040" cy="1186920"/>
+          </a:xfrm>
+          <a:prstGeom prst="rect">
+            <a:avLst/>
+          </a:prstGeom>
+          <a:noFill/>
+          <a:ln>
+            <a:noFill/>
+          </a:ln>
+        </p:spPr>
+        <p:style>
+          <a:lnRef idx="0"/>
+          <a:fillRef idx="0"/>
+          <a:effectRef idx="0"/>
+          <a:fontRef idx="minor"/>
+        </p:style>
+        <p:txBody>
+          <a:bodyPr lIns="90000" rIns="90000" tIns="45000" bIns="45000">
+            <a:spAutoFit/>
+          </a:bodyPr>
+          <a:p>
+            <a:pPr marL="216000" indent="-216000">
               <a:lnSpc>
-                <a:spcPct val="125000"/>
+                <a:spcPct val="100000"/>
               </a:lnSpc>
               <a:buClr>
                 <a:srgbClr val="000000"/>
               </a:buClr>
-              <a:buSzPct val="45000"/>
               <a:buFont typeface="Wingdings" charset="2"/>
               <a:buChar char=""/>
             </a:pPr>
             <a:r>
-              <a:rPr b="0" lang="en-US" sz="2000" spc="-1" strike="noStrike">
-                <a:solidFill>
-                  <a:srgbClr val="000000"/>
-                </a:solidFill>
-                <a:latin typeface="Arial"/>
+              <a:rPr b="0" lang="en-US" sz="1800" spc="-1" strike="noStrike">
+                <a:latin typeface="Nimbus Sans"/>
               </a:rPr>
-              <a:t>More complex, need addional Hardware</a:t>
+              <a:t>Expensive</a:t>
             </a:r>
-            <a:endParaRPr b="0" lang="en-US" sz="2000" spc="-1" strike="noStrike">
-              <a:latin typeface="Nimbus Sans"/>
-            </a:endParaRPr>
-          </a:p>
-          <a:p>
-            <a:pPr lvl="1" marL="432000" indent="-216000">
+            <a:endParaRPr b="0" lang="en-US" sz="1800" spc="-1" strike="noStrike">
+              <a:latin typeface="Nimbus Sans"/>
+            </a:endParaRPr>
+          </a:p>
+          <a:p>
+            <a:pPr marL="216000" indent="-216000">
               <a:lnSpc>
-                <a:spcPct val="125000"/>
+                <a:spcPct val="100000"/>
               </a:lnSpc>
               <a:buClr>
                 <a:srgbClr val="000000"/>
               </a:buClr>
-              <a:buSzPct val="45000"/>
               <a:buFont typeface="Wingdings" charset="2"/>
               <a:buChar char=""/>
             </a:pPr>
             <a:r>
-              <a:rPr b="0" lang="en-US" sz="2000" spc="-1" strike="noStrike">
-                <a:solidFill>
-                  <a:srgbClr val="000000"/>
-                </a:solidFill>
-                <a:latin typeface="Arial"/>
+              <a:rPr b="0" lang="en-US" sz="1800" spc="-1" strike="noStrike">
+                <a:latin typeface="Nimbus Sans"/>
               </a:rPr>
-              <a:t>Needs time to set up and maintenance work in the field</a:t>
+              <a:t>Requires maintanence</a:t>
             </a:r>
-            <a:endParaRPr b="0" lang="en-US" sz="2000" spc="-1" strike="noStrike">
-              <a:latin typeface="Nimbus Sans"/>
-            </a:endParaRPr>
-          </a:p>
-          <a:p>
-            <a:pPr lvl="1" marL="432000" indent="-216000">
+            <a:endParaRPr b="0" lang="en-US" sz="1800" spc="-1" strike="noStrike">
+              <a:latin typeface="Nimbus Sans"/>
+            </a:endParaRPr>
+          </a:p>
+          <a:p>
+            <a:pPr marL="216000" indent="-216000">
               <a:lnSpc>
-                <a:spcPct val="125000"/>
+                <a:spcPct val="100000"/>
               </a:lnSpc>
               <a:buClr>
                 <a:srgbClr val="000000"/>
               </a:buClr>
-              <a:buSzPct val="45000"/>
               <a:buFont typeface="Wingdings" charset="2"/>
               <a:buChar char=""/>
             </a:pPr>
             <a:r>
-              <a:rPr b="0" lang="en-US" sz="2000" spc="-1" strike="noStrike">
-                <a:solidFill>
-                  <a:srgbClr val="000000"/>
-                </a:solidFill>
-                <a:latin typeface="Arial"/>
+              <a:rPr b="0" lang="en-US" sz="1800" spc="-1" strike="noStrike">
+                <a:latin typeface="Nimbus Sans"/>
               </a:rPr>
-              <a:t>Shadowing</a:t>
+              <a:t>Additional HW and set up required</a:t>
             </a:r>
-            <a:endParaRPr b="0" lang="en-US" sz="2000" spc="-1" strike="noStrike">
+            <a:endParaRPr b="0" lang="en-US" sz="1800" spc="-1" strike="noStrike">
               <a:latin typeface="Nimbus Sans"/>
             </a:endParaRPr>
           </a:p>
@@ -6983,42 +7220,7 @@
                                           </p:stCondLst>
                                         </p:cTn>
                                         <p:tgtEl>
-                                          <p:spTgt spid="143">
-                                            <p:txEl>
-                                              <p:pRg st="0" end="0"/>
-                                            </p:txEl>
-                                          </p:spTgt>
-                                        </p:tgtEl>
-                                        <p:attrNameLst>
-                                          <p:attrName>style.visibility</p:attrName>
-                                        </p:attrNameLst>
-                                      </p:cBhvr>
-                                      <p:to>
-                                        <p:strVal val="visible"/>
-                                      </p:to>
-                                    </p:set>
-                                  </p:childTnLst>
-                                </p:cTn>
-                              </p:par>
-                              <p:par>
-                                <p:cTn id="21" nodeType="withEffect" fill="hold" presetClass="entr" presetID="1">
-                                  <p:stCondLst>
-                                    <p:cond delay="0"/>
-                                  </p:stCondLst>
-                                  <p:childTnLst>
-                                    <p:set>
-                                      <p:cBhvr>
-                                        <p:cTn id="22" dur="1" fill="hold">
-                                          <p:stCondLst>
-                                            <p:cond delay="0"/>
-                                          </p:stCondLst>
-                                        </p:cTn>
-                                        <p:tgtEl>
-                                          <p:spTgt spid="143">
-                                            <p:txEl>
-                                              <p:pRg st="1" end="1"/>
-                                            </p:txEl>
-                                          </p:spTgt>
+                                          <p:spTgt spid="141"/>
                                         </p:tgtEl>
                                         <p:attrNameLst>
                                           <p:attrName>style.visibility</p:attrName>
@@ -7038,36 +7240,32 @@
                     </p:cTn>
                   </p:par>
                   <p:par>
-                    <p:cTn id="23" fill="hold">
+                    <p:cTn id="21" fill="hold">
                       <p:stCondLst>
                         <p:cond delay="indefinite"/>
                       </p:stCondLst>
                       <p:childTnLst>
                         <p:par>
-                          <p:cTn id="24" fill="hold">
+                          <p:cTn id="22" fill="hold">
                             <p:stCondLst>
                               <p:cond delay="0"/>
                             </p:stCondLst>
                             <p:childTnLst>
                               <p:par>
-                                <p:cTn id="25" nodeType="clickEffect" fill="hold" presetClass="entr" presetID="1">
+                                <p:cTn id="23" nodeType="clickEffect" fill="hold" presetClass="entr" presetID="1">
                                   <p:stCondLst>
                                     <p:cond delay="0"/>
                                   </p:stCondLst>
                                   <p:childTnLst>
                                     <p:set>
                                       <p:cBhvr>
-                                        <p:cTn id="26" dur="1" fill="hold">
+                                        <p:cTn id="24" dur="1" fill="hold">
                                           <p:stCondLst>
                                             <p:cond delay="0"/>
                                           </p:stCondLst>
                                         </p:cTn>
                                         <p:tgtEl>
-                                          <p:spTgt spid="143">
-                                            <p:txEl>
-                                              <p:pRg st="2" end="2"/>
-                                            </p:txEl>
-                                          </p:spTgt>
+                                          <p:spTgt spid="142"/>
                                         </p:tgtEl>
                                         <p:attrNameLst>
                                           <p:attrName>style.visibility</p:attrName>
@@ -7080,8 +7278,26 @@
                                   </p:childTnLst>
                                 </p:cTn>
                               </p:par>
+                            </p:childTnLst>
+                          </p:cTn>
+                        </p:par>
+                      </p:childTnLst>
+                    </p:cTn>
+                  </p:par>
+                  <p:par>
+                    <p:cTn id="25" fill="hold">
+                      <p:stCondLst>
+                        <p:cond delay="indefinite"/>
+                      </p:stCondLst>
+                      <p:childTnLst>
+                        <p:par>
+                          <p:cTn id="26" fill="hold">
+                            <p:stCondLst>
+                              <p:cond delay="0"/>
+                            </p:stCondLst>
+                            <p:childTnLst>
                               <p:par>
-                                <p:cTn id="27" nodeType="withEffect" fill="hold" presetClass="entr" presetID="1">
+                                <p:cTn id="27" nodeType="clickEffect" fill="hold" presetClass="entr" presetID="1">
                                   <p:stCondLst>
                                     <p:cond delay="0"/>
                                   </p:stCondLst>
@@ -7094,11 +7310,7 @@
                                           </p:stCondLst>
                                         </p:cTn>
                                         <p:tgtEl>
-                                          <p:spTgt spid="143">
-                                            <p:txEl>
-                                              <p:pRg st="3" end="3"/>
-                                            </p:txEl>
-                                          </p:spTgt>
+                                          <p:spTgt spid="143"/>
                                         </p:tgtEl>
                                         <p:attrNameLst>
                                           <p:attrName>style.visibility</p:attrName>
@@ -7111,39 +7323,26 @@
                                   </p:childTnLst>
                                 </p:cTn>
                               </p:par>
+                            </p:childTnLst>
+                          </p:cTn>
+                        </p:par>
+                      </p:childTnLst>
+                    </p:cTn>
+                  </p:par>
+                  <p:par>
+                    <p:cTn id="29" fill="hold">
+                      <p:stCondLst>
+                        <p:cond delay="indefinite"/>
+                      </p:stCondLst>
+                      <p:childTnLst>
+                        <p:par>
+                          <p:cTn id="30" fill="hold">
+                            <p:stCondLst>
+                              <p:cond delay="0"/>
+                            </p:stCondLst>
+                            <p:childTnLst>
                               <p:par>
-                                <p:cTn id="29" nodeType="withEffect" fill="hold" presetClass="entr" presetID="1">
-                                  <p:stCondLst>
-                                    <p:cond delay="0"/>
-                                  </p:stCondLst>
-                                  <p:childTnLst>
-                                    <p:set>
-                                      <p:cBhvr>
-                                        <p:cTn id="30" dur="1" fill="hold">
-                                          <p:stCondLst>
-                                            <p:cond delay="0"/>
-                                          </p:stCondLst>
-                                        </p:cTn>
-                                        <p:tgtEl>
-                                          <p:spTgt spid="143">
-                                            <p:txEl>
-                                              <p:pRg st="4" end="4"/>
-                                            </p:txEl>
-                                          </p:spTgt>
-                                        </p:tgtEl>
-                                        <p:attrNameLst>
-                                          <p:attrName>style.visibility</p:attrName>
-                                        </p:attrNameLst>
-                                      </p:cBhvr>
-                                      <p:to>
-                                        <p:strVal val="visible"/>
-                                      </p:to>
-                                    </p:set>
-                                  </p:childTnLst>
-                                </p:cTn>
-                              </p:par>
-                              <p:par>
-                                <p:cTn id="31" nodeType="withEffect" fill="hold" presetClass="entr" presetID="1">
+                                <p:cTn id="31" nodeType="clickEffect" fill="hold" presetClass="entr" presetID="1">
                                   <p:stCondLst>
                                     <p:cond delay="0"/>
                                   </p:stCondLst>
@@ -7156,11 +7355,7 @@
                                           </p:stCondLst>
                                         </p:cTn>
                                         <p:tgtEl>
-                                          <p:spTgt spid="143">
-                                            <p:txEl>
-                                              <p:pRg st="5" end="5"/>
-                                            </p:txEl>
-                                          </p:spTgt>
+                                          <p:spTgt spid="144"/>
                                         </p:tgtEl>
                                         <p:attrNameLst>
                                           <p:attrName>style.visibility</p:attrName>
@@ -7204,6 +7399,246 @@
 </p:sld>
 </file>
 
+<file path=ppt/slides/slide4.xml><?xml version="1.0" encoding="utf-8"?>
+<p:sld xmlns:a="http://schemas.openxmlformats.org/drawingml/2006/main" xmlns:p="http://schemas.openxmlformats.org/presentationml/2006/main" xmlns:r="http://schemas.openxmlformats.org/officeDocument/2006/relationships" xmlns:p14="http://schemas.microsoft.com/office/powerpoint/2010/main" xmlns:p15="http://schemas.microsoft.com/office/powerpoint/2012/main" xmlns:mc="http://schemas.openxmlformats.org/markup-compatibility/2006">
+  <p:cSld>
+    <p:spTree>
+      <p:nvGrpSpPr>
+        <p:cNvPr id="1" name=""/>
+        <p:cNvGrpSpPr/>
+        <p:nvPr/>
+      </p:nvGrpSpPr>
+      <p:grpSpPr>
+        <a:xfrm>
+          <a:off x="0" y="0"/>
+          <a:ext cx="0" cy="0"/>
+          <a:chOff x="0" y="0"/>
+          <a:chExt cx="0" cy="0"/>
+        </a:xfrm>
+      </p:grpSpPr>
+      <p:sp>
+        <p:nvSpPr>
+          <p:cNvPr id="145" name="CustomShape 1"/>
+          <p:cNvSpPr/>
+          <p:nvPr/>
+        </p:nvSpPr>
+        <p:spPr>
+          <a:xfrm>
+            <a:off x="358920" y="1266120"/>
+            <a:ext cx="8420760" cy="1659600"/>
+          </a:xfrm>
+          <a:prstGeom prst="rect">
+            <a:avLst/>
+          </a:prstGeom>
+          <a:noFill/>
+          <a:ln>
+            <a:noFill/>
+          </a:ln>
+        </p:spPr>
+        <p:style>
+          <a:lnRef idx="0"/>
+          <a:fillRef idx="0"/>
+          <a:effectRef idx="0"/>
+          <a:fontRef idx="minor"/>
+        </p:style>
+        <p:txBody>
+          <a:bodyPr lIns="90000" rIns="90000" tIns="45000" bIns="45000">
+            <a:noAutofit/>
+          </a:bodyPr>
+          <a:p>
+            <a:pPr marL="179280" indent="-178200">
+              <a:lnSpc>
+                <a:spcPct val="125000"/>
+              </a:lnSpc>
+              <a:buClr>
+                <a:srgbClr val="0065bd"/>
+              </a:buClr>
+              <a:buFont typeface="Wingdings" charset="2"/>
+              <a:buChar char=""/>
+            </a:pPr>
+            <a:r>
+              <a:rPr b="0" lang="en-US" sz="1800" spc="-1" strike="noStrike">
+                <a:solidFill>
+                  <a:srgbClr val="000000"/>
+                </a:solidFill>
+                <a:latin typeface="Arial"/>
+                <a:ea typeface="DejaVu Sans"/>
+              </a:rPr>
+              <a:t>Currently commercial solutions exist for tracking but are expensive and bulky</a:t>
+            </a:r>
+            <a:endParaRPr b="0" lang="en-US" sz="1800" spc="-1" strike="noStrike">
+              <a:latin typeface="Nimbus Sans"/>
+            </a:endParaRPr>
+          </a:p>
+          <a:p>
+            <a:pPr marL="179280" indent="-178200">
+              <a:lnSpc>
+                <a:spcPct val="125000"/>
+              </a:lnSpc>
+              <a:buClr>
+                <a:srgbClr val="0065bd"/>
+              </a:buClr>
+              <a:buFont typeface="Wingdings" charset="2"/>
+              <a:buChar char=""/>
+            </a:pPr>
+            <a:r>
+              <a:rPr b="0" lang="en-US" sz="1800" spc="-1" strike="noStrike">
+                <a:solidFill>
+                  <a:srgbClr val="000000"/>
+                </a:solidFill>
+                <a:latin typeface="Arial"/>
+                <a:ea typeface="DejaVu Sans"/>
+              </a:rPr>
+              <a:t>They use the MPPT (mean peak power tracking) algorithms which are complex and take time consuming to develop.</a:t>
+            </a:r>
+            <a:endParaRPr b="0" lang="en-US" sz="1800" spc="-1" strike="noStrike">
+              <a:latin typeface="Nimbus Sans"/>
+            </a:endParaRPr>
+          </a:p>
+          <a:p>
+            <a:pPr marL="179280" indent="-178200">
+              <a:lnSpc>
+                <a:spcPct val="125000"/>
+              </a:lnSpc>
+              <a:buClr>
+                <a:srgbClr val="0065bd"/>
+              </a:buClr>
+              <a:buFont typeface="Wingdings" charset="2"/>
+              <a:buChar char=""/>
+            </a:pPr>
+            <a:r>
+              <a:rPr b="0" lang="en-US" sz="1800" spc="-1" strike="noStrike">
+                <a:solidFill>
+                  <a:srgbClr val="000000"/>
+                </a:solidFill>
+                <a:latin typeface="Arial"/>
+                <a:ea typeface="DejaVu Sans"/>
+              </a:rPr>
+              <a:t>These include single-axis and dual-axis tracking systems</a:t>
+            </a:r>
+            <a:endParaRPr b="0" lang="en-US" sz="1800" spc="-1" strike="noStrike">
+              <a:latin typeface="Nimbus Sans"/>
+            </a:endParaRPr>
+          </a:p>
+          <a:p>
+            <a:pPr>
+              <a:lnSpc>
+                <a:spcPct val="125000"/>
+              </a:lnSpc>
+            </a:pPr>
+            <a:endParaRPr b="0" lang="en-US" sz="1800" spc="-1" strike="noStrike">
+              <a:latin typeface="Nimbus Sans"/>
+            </a:endParaRPr>
+          </a:p>
+          <a:p>
+            <a:pPr>
+              <a:lnSpc>
+                <a:spcPct val="125000"/>
+              </a:lnSpc>
+            </a:pPr>
+            <a:endParaRPr b="0" lang="en-US" sz="1800" spc="-1" strike="noStrike">
+              <a:latin typeface="Nimbus Sans"/>
+            </a:endParaRPr>
+          </a:p>
+          <a:p>
+            <a:pPr>
+              <a:lnSpc>
+                <a:spcPct val="125000"/>
+              </a:lnSpc>
+            </a:pPr>
+            <a:endParaRPr b="0" lang="en-US" sz="1800" spc="-1" strike="noStrike">
+              <a:latin typeface="Nimbus Sans"/>
+            </a:endParaRPr>
+          </a:p>
+        </p:txBody>
+      </p:sp>
+      <p:sp>
+        <p:nvSpPr>
+          <p:cNvPr id="146" name="CustomShape 2"/>
+          <p:cNvSpPr/>
+          <p:nvPr/>
+        </p:nvSpPr>
+        <p:spPr>
+          <a:xfrm>
+            <a:off x="358920" y="366480"/>
+            <a:ext cx="7166520" cy="358920"/>
+          </a:xfrm>
+          <a:prstGeom prst="rect">
+            <a:avLst/>
+          </a:prstGeom>
+          <a:noFill/>
+          <a:ln>
+            <a:noFill/>
+          </a:ln>
+        </p:spPr>
+        <p:style>
+          <a:lnRef idx="0"/>
+          <a:fillRef idx="0"/>
+          <a:effectRef idx="0"/>
+          <a:fontRef idx="minor"/>
+        </p:style>
+        <p:txBody>
+          <a:bodyPr lIns="90000" rIns="90000" tIns="45000" bIns="45000" anchor="ctr">
+            <a:noAutofit/>
+          </a:bodyPr>
+          <a:p>
+            <a:pPr>
+              <a:lnSpc>
+                <a:spcPct val="125000"/>
+              </a:lnSpc>
+            </a:pPr>
+            <a:r>
+              <a:rPr b="0" lang="en-US" sz="2400" spc="-1" strike="noStrike">
+                <a:solidFill>
+                  <a:srgbClr val="000000"/>
+                </a:solidFill>
+                <a:latin typeface="Arial"/>
+                <a:ea typeface="DejaVu Sans"/>
+              </a:rPr>
+              <a:t>Currently Available Solutions</a:t>
+            </a:r>
+            <a:endParaRPr b="0" lang="en-US" sz="2400" spc="-1" strike="noStrike">
+              <a:latin typeface="Nimbus Sans"/>
+            </a:endParaRPr>
+          </a:p>
+        </p:txBody>
+      </p:sp>
+      <p:pic>
+        <p:nvPicPr>
+          <p:cNvPr id="147" name="" descr=""/>
+          <p:cNvPicPr/>
+          <p:nvPr/>
+        </p:nvPicPr>
+        <p:blipFill>
+          <a:blip r:embed="rId1"/>
+          <a:stretch/>
+        </p:blipFill>
+        <p:spPr>
+          <a:xfrm>
+            <a:off x="822960" y="3200400"/>
+            <a:ext cx="2142720" cy="2142720"/>
+          </a:xfrm>
+          <a:prstGeom prst="rect">
+            <a:avLst/>
+          </a:prstGeom>
+          <a:ln>
+            <a:noFill/>
+          </a:ln>
+        </p:spPr>
+      </p:pic>
+    </p:spTree>
+  </p:cSld>
+  <mc:AlternateContent>
+    <mc:Choice Requires="p14">
+      <p:transition spd="slow" p14:dur="2000"/>
+    </mc:Choice>
+    <mc:Fallback>
+      <p:transition spd="slow"/>
+    </mc:Fallback>
+  </mc:AlternateContent>
+</p:sld>
+</file>
+
 <file path=ppt/slides/slide5.xml><?xml version="1.0" encoding="utf-8"?>
 <p:sld xmlns:a="http://schemas.openxmlformats.org/drawingml/2006/main" xmlns:p="http://schemas.openxmlformats.org/presentationml/2006/main" xmlns:r="http://schemas.openxmlformats.org/officeDocument/2006/relationships" xmlns:p14="http://schemas.microsoft.com/office/powerpoint/2010/main" xmlns:p15="http://schemas.microsoft.com/office/powerpoint/2012/main" xmlns:mc="http://schemas.openxmlformats.org/markup-compatibility/2006">
   <p:cSld>
@@ -7223,14 +7658,14 @@
       </p:grpSpPr>
       <p:sp>
         <p:nvSpPr>
-          <p:cNvPr id="144" name="CustomShape 1"/>
+          <p:cNvPr id="148" name="CustomShape 1"/>
           <p:cNvSpPr/>
           <p:nvPr/>
         </p:nvSpPr>
         <p:spPr>
           <a:xfrm>
-            <a:off x="358920" y="1266120"/>
-            <a:ext cx="8421120" cy="1659960"/>
+            <a:off x="358920" y="413280"/>
+            <a:ext cx="4051440" cy="424800"/>
           </a:xfrm>
           <a:prstGeom prst="rect">
             <a:avLst/>
@@ -7248,10 +7683,60 @@
         </p:style>
         <p:txBody>
           <a:bodyPr lIns="90000" rIns="90000" tIns="45000" bIns="45000">
+            <a:spAutoFit/>
+          </a:bodyPr>
+          <a:p>
+            <a:pPr>
+              <a:lnSpc>
+                <a:spcPct val="100000"/>
+              </a:lnSpc>
+            </a:pPr>
+            <a:r>
+              <a:rPr b="0" lang="en-US" sz="2200" spc="-1" strike="noStrike">
+                <a:solidFill>
+                  <a:srgbClr val="000000"/>
+                </a:solidFill>
+                <a:latin typeface="Arial"/>
+              </a:rPr>
+              <a:t>Our Solution</a:t>
+            </a:r>
+            <a:endParaRPr b="0" lang="en-US" sz="2200" spc="-1" strike="noStrike">
+              <a:latin typeface="Nimbus Sans"/>
+            </a:endParaRPr>
+          </a:p>
+        </p:txBody>
+      </p:sp>
+      <p:sp>
+        <p:nvSpPr>
+          <p:cNvPr id="149" name="CustomShape 2"/>
+          <p:cNvSpPr/>
+          <p:nvPr/>
+        </p:nvSpPr>
+        <p:spPr>
+          <a:xfrm>
+            <a:off x="358920" y="1021320"/>
+            <a:ext cx="8420760" cy="1659600"/>
+          </a:xfrm>
+          <a:prstGeom prst="rect">
+            <a:avLst/>
+          </a:prstGeom>
+          <a:noFill/>
+          <a:ln>
+            <a:noFill/>
+          </a:ln>
+        </p:spPr>
+        <p:style>
+          <a:lnRef idx="0"/>
+          <a:fillRef idx="0"/>
+          <a:effectRef idx="0"/>
+          <a:fontRef idx="minor"/>
+        </p:style>
+        <p:txBody>
+          <a:bodyPr lIns="90000" rIns="90000" tIns="45000" bIns="45000">
             <a:noAutofit/>
           </a:bodyPr>
           <a:p>
-            <a:pPr marL="179280" indent="-178560">
+            <a:pPr marL="179280" indent="-178200">
               <a:lnSpc>
                 <a:spcPct val="125000"/>
               </a:lnSpc>
@@ -7267,237 +7752,7 @@
                   <a:srgbClr val="000000"/>
                 </a:solidFill>
                 <a:latin typeface="Arial"/>
-              </a:rPr>
-              <a:t>Currently commercial solutions exist for tracking but are expensive and bulky</a:t>
-            </a:r>
-            <a:endParaRPr b="0" lang="en-US" sz="1800" spc="-1" strike="noStrike">
-              <a:latin typeface="Nimbus Sans"/>
-            </a:endParaRPr>
-          </a:p>
-          <a:p>
-            <a:pPr marL="179280" indent="-178560">
-              <a:lnSpc>
-                <a:spcPct val="125000"/>
-              </a:lnSpc>
-              <a:buClr>
-                <a:srgbClr val="0065bd"/>
-              </a:buClr>
-              <a:buFont typeface="Wingdings" charset="2"/>
-              <a:buChar char=""/>
-            </a:pPr>
-            <a:r>
-              <a:rPr b="0" lang="en-US" sz="1800" spc="-1" strike="noStrike">
-                <a:solidFill>
-                  <a:srgbClr val="000000"/>
-                </a:solidFill>
-                <a:latin typeface="Arial"/>
-              </a:rPr>
-              <a:t>They use the MPPT (mean peak power tracking) algorithms which are complex </a:t>
-            </a:r>
-            <a:r>
-              <a:rPr b="0" lang="en-US" sz="1800" spc="-1" strike="noStrike">
-                <a:solidFill>
-                  <a:srgbClr val="000000"/>
-                </a:solidFill>
-                <a:latin typeface="Arial"/>
-              </a:rPr>
-              <a:t>and take time consuming to develop.</a:t>
-            </a:r>
-            <a:endParaRPr b="0" lang="en-US" sz="1800" spc="-1" strike="noStrike">
-              <a:latin typeface="Nimbus Sans"/>
-            </a:endParaRPr>
-          </a:p>
-          <a:p>
-            <a:pPr marL="179280" indent="-178560">
-              <a:lnSpc>
-                <a:spcPct val="125000"/>
-              </a:lnSpc>
-              <a:buClr>
-                <a:srgbClr val="0065bd"/>
-              </a:buClr>
-              <a:buFont typeface="Wingdings" charset="2"/>
-              <a:buChar char=""/>
-            </a:pPr>
-            <a:r>
-              <a:rPr b="0" lang="en-US" sz="1800" spc="-1" strike="noStrike">
-                <a:solidFill>
-                  <a:srgbClr val="000000"/>
-                </a:solidFill>
-                <a:latin typeface="Arial"/>
-              </a:rPr>
-              <a:t>These include single-axis and dual-axis tracking systems</a:t>
-            </a:r>
-            <a:endParaRPr b="0" lang="en-US" sz="1800" spc="-1" strike="noStrike">
-              <a:latin typeface="Nimbus Sans"/>
-            </a:endParaRPr>
-          </a:p>
-          <a:p>
-            <a:pPr>
-              <a:lnSpc>
-                <a:spcPct val="125000"/>
-              </a:lnSpc>
-            </a:pPr>
-            <a:endParaRPr b="0" lang="en-US" sz="1800" spc="-1" strike="noStrike">
-              <a:latin typeface="Nimbus Sans"/>
-            </a:endParaRPr>
-          </a:p>
-          <a:p>
-            <a:pPr>
-              <a:lnSpc>
-                <a:spcPct val="125000"/>
-              </a:lnSpc>
-            </a:pPr>
-            <a:endParaRPr b="0" lang="en-US" sz="1800" spc="-1" strike="noStrike">
-              <a:latin typeface="Nimbus Sans"/>
-            </a:endParaRPr>
-          </a:p>
-          <a:p>
-            <a:pPr>
-              <a:lnSpc>
-                <a:spcPct val="125000"/>
-              </a:lnSpc>
-            </a:pPr>
-            <a:endParaRPr b="0" lang="en-US" sz="1800" spc="-1" strike="noStrike">
-              <a:latin typeface="Nimbus Sans"/>
-            </a:endParaRPr>
-          </a:p>
-        </p:txBody>
-      </p:sp>
-      <p:sp>
-        <p:nvSpPr>
-          <p:cNvPr id="145" name="CustomShape 2"/>
-          <p:cNvSpPr/>
-          <p:nvPr/>
-        </p:nvSpPr>
-        <p:spPr>
-          <a:xfrm>
-            <a:off x="358920" y="366480"/>
-            <a:ext cx="7166880" cy="359280"/>
-          </a:xfrm>
-          <a:prstGeom prst="rect">
-            <a:avLst/>
-          </a:prstGeom>
-          <a:noFill/>
-          <a:ln>
-            <a:noFill/>
-          </a:ln>
-        </p:spPr>
-        <p:style>
-          <a:lnRef idx="0"/>
-          <a:fillRef idx="0"/>
-          <a:effectRef idx="0"/>
-          <a:fontRef idx="minor"/>
-        </p:style>
-        <p:txBody>
-          <a:bodyPr lIns="90000" rIns="90000" tIns="45000" bIns="45000" anchor="ctr">
-            <a:noAutofit/>
-          </a:bodyPr>
-          <a:p>
-            <a:pPr>
-              <a:lnSpc>
-                <a:spcPct val="125000"/>
-              </a:lnSpc>
-            </a:pPr>
-            <a:r>
-              <a:rPr b="0" lang="en-US" sz="2400" spc="-1" strike="noStrike">
-                <a:solidFill>
-                  <a:srgbClr val="000000"/>
-                </a:solidFill>
-                <a:latin typeface="Arial"/>
-              </a:rPr>
-              <a:t>Currently Available Solutions</a:t>
-            </a:r>
-            <a:endParaRPr b="0" lang="en-US" sz="2400" spc="-1" strike="noStrike">
-              <a:latin typeface="Nimbus Sans"/>
-            </a:endParaRPr>
-          </a:p>
-        </p:txBody>
-      </p:sp>
-      <p:sp>
-        <p:nvSpPr>
-          <p:cNvPr id="146" name="TextShape 3"/>
-          <p:cNvSpPr txBox="1"/>
-          <p:nvPr/>
-        </p:nvSpPr>
-        <p:spPr>
-          <a:xfrm>
-            <a:off x="358920" y="2926080"/>
-            <a:ext cx="4051800" cy="395640"/>
-          </a:xfrm>
-          <a:prstGeom prst="rect">
-            <a:avLst/>
-          </a:prstGeom>
-          <a:noFill/>
-          <a:ln>
-            <a:noFill/>
-          </a:ln>
-        </p:spPr>
-        <p:txBody>
-          <a:bodyPr lIns="90000" rIns="90000" tIns="45000" bIns="45000">
-            <a:spAutoFit/>
-          </a:bodyPr>
-          <a:p>
-            <a:r>
-              <a:rPr b="0" lang="en-US" sz="2200" spc="-1" strike="noStrike">
-                <a:solidFill>
-                  <a:srgbClr val="000000"/>
-                </a:solidFill>
-                <a:latin typeface="Arial"/>
-              </a:rPr>
-              <a:t>Our Solution</a:t>
-            </a:r>
-            <a:endParaRPr b="0" lang="en-US" sz="2200" spc="-1" strike="noStrike">
-              <a:latin typeface="Nimbus Sans"/>
-            </a:endParaRPr>
-          </a:p>
-        </p:txBody>
-      </p:sp>
-      <p:sp>
-        <p:nvSpPr>
-          <p:cNvPr id="147" name="CustomShape 4"/>
-          <p:cNvSpPr/>
-          <p:nvPr/>
-        </p:nvSpPr>
-        <p:spPr>
-          <a:xfrm>
-            <a:off x="358920" y="3318120"/>
-            <a:ext cx="8421120" cy="1659960"/>
-          </a:xfrm>
-          <a:prstGeom prst="rect">
-            <a:avLst/>
-          </a:prstGeom>
-          <a:noFill/>
-          <a:ln>
-            <a:noFill/>
-          </a:ln>
-        </p:spPr>
-        <p:style>
-          <a:lnRef idx="0"/>
-          <a:fillRef idx="0"/>
-          <a:effectRef idx="0"/>
-          <a:fontRef idx="minor"/>
-        </p:style>
-        <p:txBody>
-          <a:bodyPr lIns="90000" rIns="90000" tIns="45000" bIns="45000">
-            <a:noAutofit/>
-          </a:bodyPr>
-          <a:p>
-            <a:pPr marL="179280" indent="-178560">
-              <a:lnSpc>
-                <a:spcPct val="125000"/>
-              </a:lnSpc>
-              <a:buClr>
-                <a:srgbClr val="0065bd"/>
-              </a:buClr>
-              <a:buFont typeface="Wingdings" charset="2"/>
-              <a:buChar char=""/>
-            </a:pPr>
-            <a:r>
-              <a:rPr b="0" lang="en-US" sz="1800" spc="-1" strike="noStrike">
-                <a:solidFill>
-                  <a:srgbClr val="000000"/>
-                </a:solidFill>
-                <a:latin typeface="Arial"/>
+                <a:ea typeface="DejaVu Sans"/>
               </a:rPr>
               <a:t>In our proof of concept we are going to explore using the following</a:t>
             </a:r>
@@ -7506,7 +7761,7 @@
             </a:endParaRPr>
           </a:p>
           <a:p>
-            <a:pPr lvl="1" marL="432000" indent="-216000">
+            <a:pPr lvl="1" marL="432000" indent="-215640">
               <a:lnSpc>
                 <a:spcPct val="125000"/>
               </a:lnSpc>
@@ -7523,6 +7778,7 @@
                   <a:srgbClr val="000000"/>
                 </a:solidFill>
                 <a:latin typeface="Arial"/>
+                <a:ea typeface="DejaVu Sans"/>
               </a:rPr>
               <a:t>Control the panels rotation using a servo driven by a mote</a:t>
             </a:r>
@@ -7531,7 +7787,7 @@
             </a:endParaRPr>
           </a:p>
           <a:p>
-            <a:pPr lvl="1" marL="432000" indent="-216000">
+            <a:pPr lvl="1" marL="432000" indent="-215640">
               <a:lnSpc>
                 <a:spcPct val="125000"/>
               </a:lnSpc>
@@ -7548,6 +7804,7 @@
                   <a:srgbClr val="000000"/>
                 </a:solidFill>
                 <a:latin typeface="Arial"/>
+                <a:ea typeface="DejaVu Sans"/>
               </a:rPr>
               <a:t>Link all the motes in a monitoring network </a:t>
             </a:r>
@@ -7556,7 +7813,7 @@
             </a:endParaRPr>
           </a:p>
           <a:p>
-            <a:pPr lvl="1" marL="432000" indent="-216000">
+            <a:pPr lvl="1" marL="432000" indent="-215640">
               <a:lnSpc>
                 <a:spcPct val="125000"/>
               </a:lnSpc>
@@ -7573,6 +7830,7 @@
                   <a:srgbClr val="000000"/>
                 </a:solidFill>
                 <a:latin typeface="Arial"/>
+                <a:ea typeface="DejaVu Sans"/>
               </a:rPr>
               <a:t>Single axis East to West daily sun tracking</a:t>
             </a:r>
@@ -7581,7 +7839,7 @@
             </a:endParaRPr>
           </a:p>
           <a:p>
-            <a:pPr lvl="1" marL="432000" indent="-216000">
+            <a:pPr lvl="1" marL="432000" indent="-215640">
               <a:lnSpc>
                 <a:spcPct val="125000"/>
               </a:lnSpc>
@@ -7598,6 +7856,7 @@
                   <a:srgbClr val="000000"/>
                 </a:solidFill>
                 <a:latin typeface="Arial"/>
+                <a:ea typeface="DejaVu Sans"/>
               </a:rPr>
               <a:t>Individual Panel Power tracking</a:t>
             </a:r>
@@ -7606,7 +7865,7 @@
             </a:endParaRPr>
           </a:p>
           <a:p>
-            <a:pPr lvl="1" marL="432000" indent="-216000">
+            <a:pPr lvl="1" marL="432000" indent="-215640">
               <a:lnSpc>
                 <a:spcPct val="125000"/>
               </a:lnSpc>
@@ -7623,6 +7882,7 @@
                   <a:srgbClr val="000000"/>
                 </a:solidFill>
                 <a:latin typeface="Arial"/>
+                <a:ea typeface="DejaVu Sans"/>
               </a:rPr>
               <a:t>Base station monitoring the status of the panels and reporting Status</a:t>
             </a:r>
@@ -7662,6 +7922,122 @@
           </a:p>
         </p:txBody>
       </p:sp>
+      <p:pic>
+        <p:nvPicPr>
+          <p:cNvPr id="150" name="" descr=""/>
+          <p:cNvPicPr/>
+          <p:nvPr/>
+        </p:nvPicPr>
+        <p:blipFill>
+          <a:blip r:embed="rId1"/>
+          <a:stretch/>
+        </p:blipFill>
+        <p:spPr>
+          <a:xfrm>
+            <a:off x="1393200" y="3419280"/>
+            <a:ext cx="1188720" cy="1188720"/>
+          </a:xfrm>
+          <a:prstGeom prst="rect">
+            <a:avLst/>
+          </a:prstGeom>
+          <a:ln>
+            <a:noFill/>
+          </a:ln>
+        </p:spPr>
+      </p:pic>
+      <p:pic>
+        <p:nvPicPr>
+          <p:cNvPr id="151" name="" descr=""/>
+          <p:cNvPicPr/>
+          <p:nvPr/>
+        </p:nvPicPr>
+        <p:blipFill>
+          <a:blip r:embed="rId2"/>
+          <a:stretch/>
+        </p:blipFill>
+        <p:spPr>
+          <a:xfrm>
+            <a:off x="3122640" y="3383280"/>
+            <a:ext cx="1188720" cy="1188720"/>
+          </a:xfrm>
+          <a:prstGeom prst="rect">
+            <a:avLst/>
+          </a:prstGeom>
+          <a:ln>
+            <a:noFill/>
+          </a:ln>
+        </p:spPr>
+      </p:pic>
+      <p:pic>
+        <p:nvPicPr>
+          <p:cNvPr id="152" name="" descr=""/>
+          <p:cNvPicPr/>
+          <p:nvPr/>
+        </p:nvPicPr>
+        <p:blipFill>
+          <a:blip r:embed="rId3"/>
+          <a:stretch/>
+        </p:blipFill>
+        <p:spPr>
+          <a:xfrm>
+            <a:off x="4929840" y="3419280"/>
+            <a:ext cx="1188720" cy="1188720"/>
+          </a:xfrm>
+          <a:prstGeom prst="rect">
+            <a:avLst/>
+          </a:prstGeom>
+          <a:ln>
+            <a:noFill/>
+          </a:ln>
+        </p:spPr>
+      </p:pic>
+      <p:pic>
+        <p:nvPicPr>
+          <p:cNvPr id="153" name="" descr=""/>
+          <p:cNvPicPr/>
+          <p:nvPr/>
+        </p:nvPicPr>
+        <p:blipFill>
+          <a:blip r:embed="rId4"/>
+          <a:srcRect l="28854" t="12344" r="31129" b="21719"/>
+          <a:stretch/>
+        </p:blipFill>
+        <p:spPr>
+          <a:xfrm>
+            <a:off x="4298040" y="4937760"/>
+            <a:ext cx="822600" cy="1462680"/>
+          </a:xfrm>
+          <a:prstGeom prst="rect">
+            <a:avLst/>
+          </a:prstGeom>
+          <a:ln>
+            <a:noFill/>
+          </a:ln>
+        </p:spPr>
+      </p:pic>
+      <p:pic>
+        <p:nvPicPr>
+          <p:cNvPr id="154" name="" descr=""/>
+          <p:cNvPicPr/>
+          <p:nvPr/>
+        </p:nvPicPr>
+        <p:blipFill>
+          <a:blip r:embed="rId5"/>
+          <a:stretch/>
+        </p:blipFill>
+        <p:spPr>
+          <a:xfrm>
+            <a:off x="6766560" y="3419280"/>
+            <a:ext cx="1188720" cy="1188720"/>
+          </a:xfrm>
+          <a:prstGeom prst="rect">
+            <a:avLst/>
+          </a:prstGeom>
+          <a:ln>
+            <a:noFill/>
+          </a:ln>
+        </p:spPr>
+      </p:pic>
     </p:spTree>
   </p:cSld>
   <mc:AlternateContent>
@@ -7694,14 +8070,14 @@
       </p:grpSpPr>
       <p:sp>
         <p:nvSpPr>
-          <p:cNvPr id="148" name="CustomShape 1"/>
+          <p:cNvPr id="155" name="CustomShape 1"/>
           <p:cNvSpPr/>
           <p:nvPr/>
         </p:nvSpPr>
         <p:spPr>
           <a:xfrm>
             <a:off x="358920" y="1266120"/>
-            <a:ext cx="8421120" cy="5000760"/>
+            <a:ext cx="8420760" cy="5000400"/>
           </a:xfrm>
           <a:prstGeom prst="rect">
             <a:avLst/>
@@ -7722,7 +8098,7 @@
             <a:noAutofit/>
           </a:bodyPr>
           <a:p>
-            <a:pPr marL="179280" indent="-178560">
+            <a:pPr marL="179280" indent="-178200">
               <a:lnSpc>
                 <a:spcPct val="125000"/>
               </a:lnSpc>
@@ -7738,6 +8114,7 @@
                   <a:srgbClr val="000000"/>
                 </a:solidFill>
                 <a:latin typeface="Arial"/>
+                <a:ea typeface="DejaVu Sans"/>
               </a:rPr>
               <a:t>Our Approach</a:t>
             </a:r>
@@ -7746,7 +8123,7 @@
             </a:endParaRPr>
           </a:p>
           <a:p>
-            <a:pPr lvl="1" marL="360360" indent="-180360">
+            <a:pPr lvl="1" marL="360360" indent="-180000">
               <a:lnSpc>
                 <a:spcPct val="125000"/>
               </a:lnSpc>
@@ -7762,6 +8139,7 @@
                   <a:srgbClr val="000000"/>
                 </a:solidFill>
                 <a:latin typeface="Arial"/>
+                <a:ea typeface="DejaVu Sans"/>
               </a:rPr>
               <a:t>Main steps/tasks to achieve the goal:</a:t>
             </a:r>
@@ -7770,7 +8148,7 @@
             </a:endParaRPr>
           </a:p>
           <a:p>
-            <a:pPr lvl="1" marL="360360" indent="-180360">
+            <a:pPr lvl="1" marL="360360" indent="-180000">
               <a:lnSpc>
                 <a:spcPct val="125000"/>
               </a:lnSpc>
@@ -7786,6 +8164,7 @@
                   <a:srgbClr val="000000"/>
                 </a:solidFill>
                 <a:latin typeface="Arial"/>
+                <a:ea typeface="DejaVu Sans"/>
               </a:rPr>
               <a:t>Modeling of ...</a:t>
             </a:r>
@@ -7794,7 +8173,7 @@
             </a:endParaRPr>
           </a:p>
           <a:p>
-            <a:pPr lvl="1" marL="360360" indent="-180360">
+            <a:pPr lvl="1" marL="360360" indent="-180000">
               <a:lnSpc>
                 <a:spcPct val="125000"/>
               </a:lnSpc>
@@ -7810,6 +8189,7 @@
                   <a:srgbClr val="000000"/>
                 </a:solidFill>
                 <a:latin typeface="Arial"/>
+                <a:ea typeface="DejaVu Sans"/>
               </a:rPr>
               <a:t>Implementation of ... Into ... Using ...</a:t>
             </a:r>
@@ -7818,7 +8198,7 @@
             </a:endParaRPr>
           </a:p>
           <a:p>
-            <a:pPr lvl="1" marL="360360" indent="-180360">
+            <a:pPr lvl="1" marL="360360" indent="-180000">
               <a:lnSpc>
                 <a:spcPct val="125000"/>
               </a:lnSpc>
@@ -7834,6 +8214,7 @@
                   <a:srgbClr val="000000"/>
                 </a:solidFill>
                 <a:latin typeface="Arial"/>
+                <a:ea typeface="DejaVu Sans"/>
               </a:rPr>
               <a:t>Simulation ... Of ... Using ...</a:t>
             </a:r>
@@ -7842,7 +8223,7 @@
             </a:endParaRPr>
           </a:p>
           <a:p>
-            <a:pPr lvl="1" marL="360360" indent="-180360">
+            <a:pPr lvl="1" marL="360360" indent="-180000">
               <a:lnSpc>
                 <a:spcPct val="125000"/>
               </a:lnSpc>
@@ -7858,6 +8239,7 @@
                   <a:srgbClr val="000000"/>
                 </a:solidFill>
                 <a:latin typeface="Arial"/>
+                <a:ea typeface="DejaVu Sans"/>
               </a:rPr>
               <a:t>Comparison of ...</a:t>
             </a:r>
@@ -7866,7 +8248,7 @@
             </a:endParaRPr>
           </a:p>
           <a:p>
-            <a:pPr lvl="1" marL="360360" indent="-180360">
+            <a:pPr lvl="1" marL="360360" indent="-180000">
               <a:lnSpc>
                 <a:spcPct val="125000"/>
               </a:lnSpc>
@@ -7882,6 +8264,7 @@
                   <a:srgbClr val="000000"/>
                 </a:solidFill>
                 <a:latin typeface="Arial"/>
+                <a:ea typeface="DejaVu Sans"/>
               </a:rPr>
               <a:t>...</a:t>
             </a:r>
@@ -7900,7 +8283,7 @@
             </a:endParaRPr>
           </a:p>
           <a:p>
-            <a:pPr marL="179280" indent="-178560">
+            <a:pPr marL="179280" indent="-178200">
               <a:lnSpc>
                 <a:spcPct val="125000"/>
               </a:lnSpc>
@@ -7916,6 +8299,7 @@
                   <a:srgbClr val="000000"/>
                 </a:solidFill>
                 <a:latin typeface="Arial"/>
+                <a:ea typeface="DejaVu Sans"/>
               </a:rPr>
               <a:t>Expected result(s)</a:t>
             </a:r>
@@ -7924,7 +8308,7 @@
             </a:endParaRPr>
           </a:p>
           <a:p>
-            <a:pPr lvl="1" marL="360360" indent="-180360">
+            <a:pPr lvl="1" marL="360360" indent="-180000">
               <a:lnSpc>
                 <a:spcPct val="125000"/>
               </a:lnSpc>
@@ -7940,6 +8324,7 @@
                   <a:srgbClr val="000000"/>
                 </a:solidFill>
                 <a:latin typeface="Arial"/>
+                <a:ea typeface="DejaVu Sans"/>
               </a:rPr>
               <a:t>What should be the outcome and why this is important</a:t>
             </a:r>
@@ -7951,14 +8336,14 @@
       </p:sp>
       <p:sp>
         <p:nvSpPr>
-          <p:cNvPr id="149" name="CustomShape 2"/>
+          <p:cNvPr id="156" name="CustomShape 2"/>
           <p:cNvSpPr/>
           <p:nvPr/>
         </p:nvSpPr>
         <p:spPr>
           <a:xfrm>
             <a:off x="358920" y="366480"/>
-            <a:ext cx="7166880" cy="359280"/>
+            <a:ext cx="7166520" cy="358920"/>
           </a:xfrm>
           <a:prstGeom prst="rect">
             <a:avLst/>
@@ -7990,6 +8375,7 @@
                   <a:srgbClr val="000000"/>
                 </a:solidFill>
                 <a:latin typeface="Arial"/>
+                <a:ea typeface="DejaVu Sans"/>
               </a:rPr>
               <a:t>Approach and expected results</a:t>
             </a:r>
@@ -8001,14 +8387,14 @@
       </p:sp>
       <p:sp>
         <p:nvSpPr>
-          <p:cNvPr id="150" name="CustomShape 3"/>
+          <p:cNvPr id="157" name="CustomShape 3"/>
           <p:cNvSpPr/>
           <p:nvPr/>
         </p:nvSpPr>
         <p:spPr>
           <a:xfrm>
             <a:off x="8238960" y="6441840"/>
-            <a:ext cx="563040" cy="358200"/>
+            <a:ext cx="562680" cy="357840"/>
           </a:xfrm>
           <a:prstGeom prst="rect">
             <a:avLst/>
@@ -8034,12 +8420,13 @@
                 <a:spcPct val="100000"/>
               </a:lnSpc>
             </a:pPr>
-            <a:fld id="{E88F0633-3D2A-44C3-B900-61E9A00AB02B}" type="slidenum">
+            <a:fld id="{4A9B081C-A7E5-425F-A374-1E67592BB03C}" type="slidenum">
               <a:rPr b="0" lang="en-US" sz="1200" spc="-1" strike="noStrike">
                 <a:solidFill>
                   <a:srgbClr val="000000"/>
                 </a:solidFill>
                 <a:latin typeface="Arial"/>
+                <a:ea typeface="DejaVu Sans"/>
               </a:rPr>
               <a:t>&lt;number&gt;</a:t>
             </a:fld>
@@ -8081,7 +8468,7 @@
       </p:grpSpPr>
       <p:pic>
         <p:nvPicPr>
-          <p:cNvPr id="151" name="Grafik 3" descr=""/>
+          <p:cNvPr id="158" name="Grafik 3" descr=""/>
           <p:cNvPicPr/>
           <p:nvPr/>
         </p:nvPicPr>
@@ -8092,7 +8479,7 @@
         <p:spPr>
           <a:xfrm>
             <a:off x="971640" y="1880280"/>
-            <a:ext cx="3788640" cy="3788640"/>
+            <a:ext cx="3788280" cy="3788280"/>
           </a:xfrm>
           <a:prstGeom prst="rect">
             <a:avLst/>
@@ -8104,14 +8491,14 @@
       </p:pic>
       <p:sp>
         <p:nvSpPr>
-          <p:cNvPr id="152" name="CustomShape 1"/>
+          <p:cNvPr id="159" name="CustomShape 1"/>
           <p:cNvSpPr/>
           <p:nvPr/>
         </p:nvSpPr>
         <p:spPr>
           <a:xfrm>
             <a:off x="358920" y="367200"/>
-            <a:ext cx="7162560" cy="359280"/>
+            <a:ext cx="7162200" cy="358920"/>
           </a:xfrm>
           <a:prstGeom prst="rect">
             <a:avLst/>
@@ -8130,14 +8517,14 @@
       </p:sp>
       <p:sp>
         <p:nvSpPr>
-          <p:cNvPr id="153" name="CustomShape 2"/>
+          <p:cNvPr id="160" name="CustomShape 2"/>
           <p:cNvSpPr/>
           <p:nvPr/>
         </p:nvSpPr>
         <p:spPr>
           <a:xfrm>
             <a:off x="358920" y="1276200"/>
-            <a:ext cx="8421120" cy="4990680"/>
+            <a:ext cx="8420760" cy="4990320"/>
           </a:xfrm>
           <a:prstGeom prst="rect">
             <a:avLst/>
@@ -8199,6 +8586,7 @@
                   <a:srgbClr val="000000"/>
                 </a:solidFill>
                 <a:latin typeface="Arial"/>
+                <a:ea typeface="DejaVu Sans"/>
               </a:rPr>
               <a:t>	</a:t>
             </a:r>
@@ -8208,6 +8596,7 @@
                   <a:srgbClr val="000000"/>
                 </a:solidFill>
                 <a:latin typeface="Arial"/>
+                <a:ea typeface="DejaVu Sans"/>
               </a:rPr>
               <a:t>Questions?</a:t>
             </a:r>
@@ -8239,14 +8628,14 @@
       </p:sp>
       <p:sp>
         <p:nvSpPr>
-          <p:cNvPr id="154" name="CustomShape 3"/>
+          <p:cNvPr id="161" name="CustomShape 3"/>
           <p:cNvSpPr/>
           <p:nvPr/>
         </p:nvSpPr>
         <p:spPr>
           <a:xfrm>
             <a:off x="8238960" y="6441840"/>
-            <a:ext cx="563040" cy="358200"/>
+            <a:ext cx="562680" cy="357840"/>
           </a:xfrm>
           <a:prstGeom prst="rect">
             <a:avLst/>
@@ -8272,12 +8661,13 @@
                 <a:spcPct val="100000"/>
               </a:lnSpc>
             </a:pPr>
-            <a:fld id="{88FC9461-0705-4DE1-AF8A-51ABA90061AB}" type="slidenum">
+            <a:fld id="{9F6B6763-AB9A-4885-BF61-17C2F3E24757}" type="slidenum">
               <a:rPr b="0" lang="en-US" sz="1200" spc="-1" strike="noStrike">
                 <a:solidFill>
                   <a:srgbClr val="000000"/>
                 </a:solidFill>
                 <a:latin typeface="Arial"/>
+                <a:ea typeface="DejaVu Sans"/>
               </a:rPr>
               <a:t>&lt;number&gt;</a:t>
             </a:fld>
@@ -8319,14 +8709,14 @@
       </p:grpSpPr>
       <p:sp>
         <p:nvSpPr>
-          <p:cNvPr id="155" name="CustomShape 1"/>
+          <p:cNvPr id="162" name="CustomShape 1"/>
           <p:cNvSpPr/>
           <p:nvPr/>
         </p:nvSpPr>
         <p:spPr>
           <a:xfrm>
             <a:off x="7763040" y="6428880"/>
-            <a:ext cx="1017000" cy="364320"/>
+            <a:ext cx="1016640" cy="363960"/>
           </a:xfrm>
           <a:prstGeom prst="rect">
             <a:avLst/>
@@ -8352,12 +8742,13 @@
                 <a:spcPct val="100000"/>
               </a:lnSpc>
             </a:pPr>
-            <a:fld id="{115CB535-0F84-4BCA-BBCA-51475122A084}" type="slidenum">
+            <a:fld id="{53C38A81-C153-430B-BC4F-2F3D33E32358}" type="slidenum">
               <a:rPr b="0" lang="en-US" sz="1200" spc="-1" strike="noStrike">
                 <a:solidFill>
                   <a:srgbClr val="000000"/>
                 </a:solidFill>
                 <a:latin typeface="Arial"/>
+                <a:ea typeface="DejaVu Sans"/>
               </a:rPr>
               <a:t>&lt;number&gt;</a:t>
             </a:fld>
@@ -8369,14 +8760,14 @@
       </p:sp>
       <p:sp>
         <p:nvSpPr>
-          <p:cNvPr id="156" name="CustomShape 2"/>
+          <p:cNvPr id="163" name="CustomShape 2"/>
           <p:cNvSpPr/>
           <p:nvPr/>
         </p:nvSpPr>
         <p:spPr>
           <a:xfrm>
             <a:off x="358920" y="366480"/>
-            <a:ext cx="7138440" cy="359280"/>
+            <a:ext cx="7138080" cy="358920"/>
           </a:xfrm>
           <a:prstGeom prst="rect">
             <a:avLst/>
@@ -8408,6 +8799,7 @@
                   <a:srgbClr val="000000"/>
                 </a:solidFill>
                 <a:latin typeface="Arial"/>
+                <a:ea typeface="DejaVu Sans"/>
               </a:rPr>
               <a:t>Timeplan</a:t>
             </a:r>
@@ -8419,14 +8811,14 @@
       </p:sp>
       <p:sp>
         <p:nvSpPr>
-          <p:cNvPr id="157" name="CustomShape 3"/>
+          <p:cNvPr id="164" name="CustomShape 3"/>
           <p:cNvSpPr/>
           <p:nvPr/>
         </p:nvSpPr>
         <p:spPr>
           <a:xfrm>
             <a:off x="358920" y="1266120"/>
-            <a:ext cx="8421120" cy="5000760"/>
+            <a:ext cx="8420760" cy="5000400"/>
           </a:xfrm>
           <a:prstGeom prst="rect">
             <a:avLst/>

</xml_diff>

<commit_message>
PPT for final presentation set up
</commit_message>
<xml_diff>
--- a/kick_off_presentation/wsnlab-ss19-kickoff-group1.pptx
+++ b/kick_off_presentation/wsnlab-ss19-kickoff-group1.pptx
@@ -16924,7 +16924,7 @@
               </a:lnSpc>
             </a:pPr>
             <a:r>
-              <a:rPr lang="en-US" sz="1800" b="0" strike="noStrike" spc="-1">
+              <a:rPr lang="en-US" sz="1800" b="0" strike="noStrike" spc="-1" dirty="0">
                 <a:solidFill>
                   <a:srgbClr val="000000"/>
                 </a:solidFill>
@@ -16933,7 +16933,7 @@
               </a:rPr>
               <a:t>Fossil fuels reliance</a:t>
             </a:r>
-            <a:endParaRPr lang="en-US" sz="1800" b="0" strike="noStrike" spc="-1">
+            <a:endParaRPr lang="en-US" sz="1800" b="0" strike="noStrike" spc="-1" dirty="0">
               <a:latin typeface="Nimbus Sans"/>
             </a:endParaRPr>
           </a:p>

</xml_diff>